<commit_message>
Add alpha fold prediction and figure work
</commit_message>
<xml_diff>
--- a/Figure 1/Fig.1A.pptx
+++ b/Figure 1/Fig.1A.pptx
@@ -255,7 +255,7 @@
           <a:p>
             <a:fld id="{377E1556-387F-4C4D-9CCC-E001782B76BD}" type="datetimeFigureOut">
               <a:rPr lang="en-US" smtClean="0"/>
-              <a:t>10/26/2021</a:t>
+              <a:t>1/14/2022</a:t>
             </a:fld>
             <a:endParaRPr lang="en-US"/>
           </a:p>
@@ -425,7 +425,7 @@
           <a:p>
             <a:fld id="{377E1556-387F-4C4D-9CCC-E001782B76BD}" type="datetimeFigureOut">
               <a:rPr lang="en-US" smtClean="0"/>
-              <a:t>10/26/2021</a:t>
+              <a:t>1/14/2022</a:t>
             </a:fld>
             <a:endParaRPr lang="en-US"/>
           </a:p>
@@ -605,7 +605,7 @@
           <a:p>
             <a:fld id="{377E1556-387F-4C4D-9CCC-E001782B76BD}" type="datetimeFigureOut">
               <a:rPr lang="en-US" smtClean="0"/>
-              <a:t>10/26/2021</a:t>
+              <a:t>1/14/2022</a:t>
             </a:fld>
             <a:endParaRPr lang="en-US"/>
           </a:p>
@@ -775,7 +775,7 @@
           <a:p>
             <a:fld id="{377E1556-387F-4C4D-9CCC-E001782B76BD}" type="datetimeFigureOut">
               <a:rPr lang="en-US" smtClean="0"/>
-              <a:t>10/26/2021</a:t>
+              <a:t>1/14/2022</a:t>
             </a:fld>
             <a:endParaRPr lang="en-US"/>
           </a:p>
@@ -1021,7 +1021,7 @@
           <a:p>
             <a:fld id="{377E1556-387F-4C4D-9CCC-E001782B76BD}" type="datetimeFigureOut">
               <a:rPr lang="en-US" smtClean="0"/>
-              <a:t>10/26/2021</a:t>
+              <a:t>1/14/2022</a:t>
             </a:fld>
             <a:endParaRPr lang="en-US"/>
           </a:p>
@@ -1253,7 +1253,7 @@
           <a:p>
             <a:fld id="{377E1556-387F-4C4D-9CCC-E001782B76BD}" type="datetimeFigureOut">
               <a:rPr lang="en-US" smtClean="0"/>
-              <a:t>10/26/2021</a:t>
+              <a:t>1/14/2022</a:t>
             </a:fld>
             <a:endParaRPr lang="en-US"/>
           </a:p>
@@ -1620,7 +1620,7 @@
           <a:p>
             <a:fld id="{377E1556-387F-4C4D-9CCC-E001782B76BD}" type="datetimeFigureOut">
               <a:rPr lang="en-US" smtClean="0"/>
-              <a:t>10/26/2021</a:t>
+              <a:t>1/14/2022</a:t>
             </a:fld>
             <a:endParaRPr lang="en-US"/>
           </a:p>
@@ -1738,7 +1738,7 @@
           <a:p>
             <a:fld id="{377E1556-387F-4C4D-9CCC-E001782B76BD}" type="datetimeFigureOut">
               <a:rPr lang="en-US" smtClean="0"/>
-              <a:t>10/26/2021</a:t>
+              <a:t>1/14/2022</a:t>
             </a:fld>
             <a:endParaRPr lang="en-US"/>
           </a:p>
@@ -1833,7 +1833,7 @@
           <a:p>
             <a:fld id="{377E1556-387F-4C4D-9CCC-E001782B76BD}" type="datetimeFigureOut">
               <a:rPr lang="en-US" smtClean="0"/>
-              <a:t>10/26/2021</a:t>
+              <a:t>1/14/2022</a:t>
             </a:fld>
             <a:endParaRPr lang="en-US"/>
           </a:p>
@@ -2110,7 +2110,7 @@
           <a:p>
             <a:fld id="{377E1556-387F-4C4D-9CCC-E001782B76BD}" type="datetimeFigureOut">
               <a:rPr lang="en-US" smtClean="0"/>
-              <a:t>10/26/2021</a:t>
+              <a:t>1/14/2022</a:t>
             </a:fld>
             <a:endParaRPr lang="en-US"/>
           </a:p>
@@ -2363,7 +2363,7 @@
           <a:p>
             <a:fld id="{377E1556-387F-4C4D-9CCC-E001782B76BD}" type="datetimeFigureOut">
               <a:rPr lang="en-US" smtClean="0"/>
-              <a:t>10/26/2021</a:t>
+              <a:t>1/14/2022</a:t>
             </a:fld>
             <a:endParaRPr lang="en-US"/>
           </a:p>
@@ -2576,7 +2576,7 @@
           <a:p>
             <a:fld id="{377E1556-387F-4C4D-9CCC-E001782B76BD}" type="datetimeFigureOut">
               <a:rPr lang="en-US" smtClean="0"/>
-              <a:t>10/26/2021</a:t>
+              <a:t>1/14/2022</a:t>
             </a:fld>
             <a:endParaRPr lang="en-US"/>
           </a:p>
@@ -2981,6 +2981,251 @@
           <a:chExt cx="0" cy="0"/>
         </a:xfrm>
       </p:grpSpPr>
+      <p:sp>
+        <p:nvSpPr>
+          <p:cNvPr id="114" name="Rectangle 113"/>
+          <p:cNvSpPr/>
+          <p:nvPr/>
+        </p:nvSpPr>
+        <p:spPr>
+          <a:xfrm>
+            <a:off x="4415761" y="3371905"/>
+            <a:ext cx="246409" cy="91440"/>
+          </a:xfrm>
+          <a:prstGeom prst="rect">
+            <a:avLst/>
+          </a:prstGeom>
+          <a:solidFill>
+            <a:srgbClr val="FFD9D9">
+              <a:alpha val="46667"/>
+            </a:srgbClr>
+          </a:solidFill>
+          <a:ln>
+            <a:noFill/>
+          </a:ln>
+          <a:effectLst/>
+        </p:spPr>
+        <p:style>
+          <a:lnRef idx="2">
+            <a:schemeClr val="accent1">
+              <a:shade val="50000"/>
+            </a:schemeClr>
+          </a:lnRef>
+          <a:fillRef idx="1">
+            <a:schemeClr val="accent1"/>
+          </a:fillRef>
+          <a:effectRef idx="0">
+            <a:schemeClr val="accent1"/>
+          </a:effectRef>
+          <a:fontRef idx="minor">
+            <a:schemeClr val="lt1"/>
+          </a:fontRef>
+        </p:style>
+        <p:txBody>
+          <a:bodyPr rtlCol="0" anchor="ctr"/>
+          <a:lstStyle/>
+          <a:p>
+            <a:pPr algn="ctr"/>
+            <a:endParaRPr lang="en-US"/>
+          </a:p>
+        </p:txBody>
+      </p:sp>
+      <p:sp>
+        <p:nvSpPr>
+          <p:cNvPr id="112" name="Rectangle 111"/>
+          <p:cNvSpPr/>
+          <p:nvPr/>
+        </p:nvSpPr>
+        <p:spPr>
+          <a:xfrm>
+            <a:off x="4417031" y="3269142"/>
+            <a:ext cx="246409" cy="91440"/>
+          </a:xfrm>
+          <a:prstGeom prst="rect">
+            <a:avLst/>
+          </a:prstGeom>
+          <a:solidFill>
+            <a:srgbClr val="FF8181">
+              <a:alpha val="46667"/>
+            </a:srgbClr>
+          </a:solidFill>
+          <a:ln>
+            <a:noFill/>
+          </a:ln>
+          <a:effectLst/>
+        </p:spPr>
+        <p:style>
+          <a:lnRef idx="2">
+            <a:schemeClr val="accent1">
+              <a:shade val="50000"/>
+            </a:schemeClr>
+          </a:lnRef>
+          <a:fillRef idx="1">
+            <a:schemeClr val="accent1"/>
+          </a:fillRef>
+          <a:effectRef idx="0">
+            <a:schemeClr val="accent1"/>
+          </a:effectRef>
+          <a:fontRef idx="minor">
+            <a:schemeClr val="lt1"/>
+          </a:fontRef>
+        </p:style>
+        <p:txBody>
+          <a:bodyPr rtlCol="0" anchor="ctr"/>
+          <a:lstStyle/>
+          <a:p>
+            <a:pPr algn="ctr"/>
+            <a:endParaRPr lang="en-US"/>
+          </a:p>
+        </p:txBody>
+      </p:sp>
+      <p:sp>
+        <p:nvSpPr>
+          <p:cNvPr id="109" name="Rectangle 108"/>
+          <p:cNvSpPr/>
+          <p:nvPr/>
+        </p:nvSpPr>
+        <p:spPr>
+          <a:xfrm>
+            <a:off x="4417031" y="3876425"/>
+            <a:ext cx="246409" cy="91440"/>
+          </a:xfrm>
+          <a:prstGeom prst="rect">
+            <a:avLst/>
+          </a:prstGeom>
+          <a:solidFill>
+            <a:srgbClr val="A40000">
+              <a:alpha val="46667"/>
+            </a:srgbClr>
+          </a:solidFill>
+          <a:ln>
+            <a:noFill/>
+          </a:ln>
+          <a:effectLst/>
+        </p:spPr>
+        <p:style>
+          <a:lnRef idx="2">
+            <a:schemeClr val="accent1">
+              <a:shade val="50000"/>
+            </a:schemeClr>
+          </a:lnRef>
+          <a:fillRef idx="1">
+            <a:schemeClr val="accent1"/>
+          </a:fillRef>
+          <a:effectRef idx="0">
+            <a:schemeClr val="accent1"/>
+          </a:effectRef>
+          <a:fontRef idx="minor">
+            <a:schemeClr val="lt1"/>
+          </a:fontRef>
+        </p:style>
+        <p:txBody>
+          <a:bodyPr rtlCol="0" anchor="ctr"/>
+          <a:lstStyle/>
+          <a:p>
+            <a:pPr algn="ctr"/>
+            <a:endParaRPr lang="en-US"/>
+          </a:p>
+        </p:txBody>
+      </p:sp>
+      <p:sp>
+        <p:nvSpPr>
+          <p:cNvPr id="106" name="Rectangle 105"/>
+          <p:cNvSpPr/>
+          <p:nvPr/>
+        </p:nvSpPr>
+        <p:spPr>
+          <a:xfrm>
+            <a:off x="4417031" y="3775567"/>
+            <a:ext cx="246409" cy="91440"/>
+          </a:xfrm>
+          <a:prstGeom prst="rect">
+            <a:avLst/>
+          </a:prstGeom>
+          <a:solidFill>
+            <a:srgbClr val="FF0000">
+              <a:alpha val="47000"/>
+            </a:srgbClr>
+          </a:solidFill>
+          <a:ln>
+            <a:noFill/>
+          </a:ln>
+          <a:effectLst/>
+        </p:spPr>
+        <p:style>
+          <a:lnRef idx="2">
+            <a:schemeClr val="accent1">
+              <a:shade val="50000"/>
+            </a:schemeClr>
+          </a:lnRef>
+          <a:fillRef idx="1">
+            <a:schemeClr val="accent1"/>
+          </a:fillRef>
+          <a:effectRef idx="0">
+            <a:schemeClr val="accent1"/>
+          </a:effectRef>
+          <a:fontRef idx="minor">
+            <a:schemeClr val="lt1"/>
+          </a:fontRef>
+        </p:style>
+        <p:txBody>
+          <a:bodyPr rtlCol="0" anchor="ctr"/>
+          <a:lstStyle/>
+          <a:p>
+            <a:pPr algn="ctr"/>
+            <a:endParaRPr lang="en-US"/>
+          </a:p>
+        </p:txBody>
+      </p:sp>
+      <p:sp>
+        <p:nvSpPr>
+          <p:cNvPr id="34" name="Rectangle 33"/>
+          <p:cNvSpPr/>
+          <p:nvPr/>
+        </p:nvSpPr>
+        <p:spPr>
+          <a:xfrm>
+            <a:off x="4417031" y="3165068"/>
+            <a:ext cx="246409" cy="91440"/>
+          </a:xfrm>
+          <a:prstGeom prst="rect">
+            <a:avLst/>
+          </a:prstGeom>
+          <a:solidFill>
+            <a:srgbClr val="FF4343">
+              <a:alpha val="46667"/>
+            </a:srgbClr>
+          </a:solidFill>
+          <a:ln>
+            <a:noFill/>
+          </a:ln>
+          <a:effectLst/>
+        </p:spPr>
+        <p:style>
+          <a:lnRef idx="2">
+            <a:schemeClr val="accent1">
+              <a:shade val="50000"/>
+            </a:schemeClr>
+          </a:lnRef>
+          <a:fillRef idx="1">
+            <a:schemeClr val="accent1"/>
+          </a:fillRef>
+          <a:effectRef idx="0">
+            <a:schemeClr val="accent1"/>
+          </a:effectRef>
+          <a:fontRef idx="minor">
+            <a:schemeClr val="lt1"/>
+          </a:fontRef>
+        </p:style>
+        <p:txBody>
+          <a:bodyPr rtlCol="0" anchor="ctr"/>
+          <a:lstStyle/>
+          <a:p>
+            <a:pPr algn="ctr"/>
+            <a:endParaRPr lang="en-US"/>
+          </a:p>
+        </p:txBody>
+      </p:sp>
       <p:sp>
         <p:nvSpPr>
           <p:cNvPr id="17" name="TextBox 16"/>
@@ -4902,7 +5147,7 @@
         </p:blipFill>
         <p:spPr>
           <a:xfrm>
-            <a:off x="3109387" y="3234467"/>
+            <a:off x="3109387" y="3211607"/>
             <a:ext cx="1034193" cy="819606"/>
           </a:xfrm>
           <a:prstGeom prst="rect">
@@ -4917,9 +5162,9 @@
           <p:nvPr/>
         </p:nvCxnSpPr>
         <p:spPr>
-          <a:xfrm flipV="1">
-            <a:off x="2616558" y="3644270"/>
-            <a:ext cx="435677" cy="28800"/>
+          <a:xfrm>
+            <a:off x="2616558" y="3673070"/>
+            <a:ext cx="429916" cy="0"/>
           </a:xfrm>
           <a:prstGeom prst="straightConnector1">
             <a:avLst/>
@@ -4984,7 +5229,7 @@
         </p:nvSpPr>
         <p:spPr>
           <a:xfrm>
-            <a:off x="3116815" y="3958144"/>
+            <a:off x="3139675" y="3958144"/>
             <a:ext cx="791302" cy="307777"/>
           </a:xfrm>
           <a:prstGeom prst="rect">
@@ -5000,298 +5245,160 @@
           <a:p>
             <a:r>
               <a:rPr lang="en-US" sz="1400" dirty="0" smtClean="0"/>
-              <a:t>Day </a:t>
-            </a:r>
-            <a:r>
-              <a:rPr lang="en-US" sz="1400" dirty="0" smtClean="0"/>
-              <a:t>4</a:t>
+              <a:t>Day 4</a:t>
             </a:r>
             <a:endParaRPr lang="en-US" sz="1400" dirty="0"/>
           </a:p>
         </p:txBody>
       </p:sp>
-      <p:pic>
-        <p:nvPicPr>
-          <p:cNvPr id="39" name="Picture 38"/>
-          <p:cNvPicPr>
-            <a:picLocks noChangeAspect="1"/>
-          </p:cNvPicPr>
+      <p:sp>
+        <p:nvSpPr>
+          <p:cNvPr id="3" name="TextBox 2"/>
+          <p:cNvSpPr txBox="1"/>
           <p:nvPr/>
-        </p:nvPicPr>
-        <p:blipFill>
-          <a:blip r:embed="rId4"/>
-          <a:stretch>
-            <a:fillRect/>
-          </a:stretch>
-        </p:blipFill>
-        <p:spPr>
-          <a:xfrm>
-            <a:off x="3950340" y="3295953"/>
-            <a:ext cx="342948" cy="190527"/>
+        </p:nvSpPr>
+        <p:spPr>
+          <a:xfrm>
+            <a:off x="4228809" y="2923876"/>
+            <a:ext cx="587044" cy="279885"/>
           </a:xfrm>
           <a:prstGeom prst="rect">
             <a:avLst/>
           </a:prstGeom>
-        </p:spPr>
-      </p:pic>
-      <p:pic>
-        <p:nvPicPr>
-          <p:cNvPr id="40" name="Picture 39"/>
-          <p:cNvPicPr>
-            <a:picLocks noChangeAspect="1"/>
-          </p:cNvPicPr>
+          <a:noFill/>
+        </p:spPr>
+        <p:txBody>
+          <a:bodyPr wrap="square" rtlCol="0">
+            <a:spAutoFit/>
+          </a:bodyPr>
+          <a:lstStyle/>
+          <a:p>
+            <a:pPr algn="ctr">
+              <a:lnSpc>
+                <a:spcPts val="700"/>
+              </a:lnSpc>
+            </a:pPr>
+            <a:r>
+              <a:rPr lang="en-US" sz="900" dirty="0" smtClean="0"/>
+              <a:t>Growth Slope</a:t>
+            </a:r>
+            <a:endParaRPr lang="en-US" sz="900" dirty="0"/>
+          </a:p>
+        </p:txBody>
+      </p:sp>
+      <p:sp>
+        <p:nvSpPr>
+          <p:cNvPr id="94" name="TextBox 93"/>
+          <p:cNvSpPr txBox="1"/>
           <p:nvPr/>
-        </p:nvPicPr>
-        <p:blipFill>
-          <a:blip r:embed="rId5"/>
-          <a:stretch>
-            <a:fillRect/>
-          </a:stretch>
-        </p:blipFill>
-        <p:spPr>
-          <a:xfrm>
-            <a:off x="3966941" y="3436668"/>
-            <a:ext cx="333422" cy="152421"/>
+        </p:nvSpPr>
+        <p:spPr>
+          <a:xfrm>
+            <a:off x="3975814" y="3135546"/>
+            <a:ext cx="467130" cy="1118255"/>
           </a:xfrm>
           <a:prstGeom prst="rect">
             <a:avLst/>
           </a:prstGeom>
-        </p:spPr>
-      </p:pic>
-      <p:pic>
-        <p:nvPicPr>
-          <p:cNvPr id="41" name="Picture 40"/>
-          <p:cNvPicPr>
-            <a:picLocks noChangeAspect="1"/>
-          </p:cNvPicPr>
-          <p:nvPr/>
-        </p:nvPicPr>
-        <p:blipFill>
-          <a:blip r:embed="rId6"/>
-          <a:stretch>
-            <a:fillRect/>
-          </a:stretch>
-        </p:blipFill>
-        <p:spPr>
-          <a:xfrm>
-            <a:off x="3955734" y="3558754"/>
-            <a:ext cx="352474" cy="114316"/>
-          </a:xfrm>
-          <a:prstGeom prst="rect">
-            <a:avLst/>
-          </a:prstGeom>
-        </p:spPr>
-      </p:pic>
-      <p:pic>
-        <p:nvPicPr>
-          <p:cNvPr id="42" name="Picture 41"/>
-          <p:cNvPicPr>
-            <a:picLocks noChangeAspect="1"/>
-          </p:cNvPicPr>
-          <p:nvPr/>
-        </p:nvPicPr>
-        <p:blipFill>
-          <a:blip r:embed="rId7"/>
-          <a:stretch>
-            <a:fillRect/>
-          </a:stretch>
-        </p:blipFill>
-        <p:spPr>
-          <a:xfrm>
-            <a:off x="3938959" y="3677199"/>
-            <a:ext cx="362001" cy="142895"/>
-          </a:xfrm>
-          <a:prstGeom prst="rect">
-            <a:avLst/>
-          </a:prstGeom>
-        </p:spPr>
-      </p:pic>
-      <p:pic>
-        <p:nvPicPr>
-          <p:cNvPr id="43" name="Picture 42"/>
-          <p:cNvPicPr>
-            <a:picLocks noChangeAspect="1"/>
-          </p:cNvPicPr>
-          <p:nvPr/>
-        </p:nvPicPr>
-        <p:blipFill>
-          <a:blip r:embed="rId8"/>
-          <a:stretch>
-            <a:fillRect/>
-          </a:stretch>
-        </p:blipFill>
-        <p:spPr>
-          <a:xfrm>
-            <a:off x="3948485" y="3809753"/>
-            <a:ext cx="342948" cy="123842"/>
-          </a:xfrm>
-          <a:prstGeom prst="rect">
-            <a:avLst/>
-          </a:prstGeom>
-        </p:spPr>
-      </p:pic>
-      <p:pic>
-        <p:nvPicPr>
-          <p:cNvPr id="44" name="Picture 43"/>
-          <p:cNvPicPr>
-            <a:picLocks noChangeAspect="1"/>
-          </p:cNvPicPr>
-          <p:nvPr/>
-        </p:nvPicPr>
-        <p:blipFill>
-          <a:blip r:embed="rId9"/>
-          <a:stretch>
-            <a:fillRect/>
-          </a:stretch>
-        </p:blipFill>
-        <p:spPr>
-          <a:xfrm>
-            <a:off x="3973560" y="3917036"/>
-            <a:ext cx="342948" cy="133369"/>
-          </a:xfrm>
-          <a:prstGeom prst="rect">
-            <a:avLst/>
-          </a:prstGeom>
-        </p:spPr>
-      </p:pic>
-      <p:pic>
-        <p:nvPicPr>
-          <p:cNvPr id="37" name="Picture 36"/>
-          <p:cNvPicPr>
-            <a:picLocks noChangeAspect="1"/>
-          </p:cNvPicPr>
-          <p:nvPr/>
-        </p:nvPicPr>
-        <p:blipFill>
-          <a:blip r:embed="rId10"/>
-          <a:stretch>
-            <a:fillRect/>
-          </a:stretch>
-        </p:blipFill>
-        <p:spPr>
-          <a:xfrm>
-            <a:off x="3943264" y="3028297"/>
-            <a:ext cx="381053" cy="200053"/>
-          </a:xfrm>
-          <a:prstGeom prst="rect">
-            <a:avLst/>
-          </a:prstGeom>
-        </p:spPr>
-      </p:pic>
-      <p:pic>
-        <p:nvPicPr>
-          <p:cNvPr id="38" name="Picture 37"/>
-          <p:cNvPicPr>
-            <a:picLocks noChangeAspect="1"/>
-          </p:cNvPicPr>
-          <p:nvPr/>
-        </p:nvPicPr>
-        <p:blipFill>
-          <a:blip r:embed="rId11"/>
-          <a:stretch>
-            <a:fillRect/>
-          </a:stretch>
-        </p:blipFill>
-        <p:spPr>
-          <a:xfrm>
-            <a:off x="3939553" y="3195112"/>
-            <a:ext cx="362001" cy="161948"/>
-          </a:xfrm>
-          <a:prstGeom prst="rect">
-            <a:avLst/>
-          </a:prstGeom>
-        </p:spPr>
-      </p:pic>
-      <p:pic>
-        <p:nvPicPr>
-          <p:cNvPr id="45" name="Picture 44"/>
-          <p:cNvPicPr>
-            <a:picLocks noChangeAspect="1"/>
-          </p:cNvPicPr>
-          <p:nvPr/>
-        </p:nvPicPr>
-        <p:blipFill>
-          <a:blip r:embed="rId12"/>
-          <a:stretch>
-            <a:fillRect/>
-          </a:stretch>
-        </p:blipFill>
-        <p:spPr>
-          <a:xfrm>
-            <a:off x="3960498" y="4044661"/>
-            <a:ext cx="371527" cy="133369"/>
-          </a:xfrm>
-          <a:prstGeom prst="rect">
-            <a:avLst/>
-          </a:prstGeom>
-        </p:spPr>
-      </p:pic>
-      <p:pic>
-        <p:nvPicPr>
-          <p:cNvPr id="46" name="Picture 45"/>
-          <p:cNvPicPr>
-            <a:picLocks noChangeAspect="1"/>
-          </p:cNvPicPr>
-          <p:nvPr/>
-        </p:nvPicPr>
-        <p:blipFill>
-          <a:blip r:embed="rId13"/>
-          <a:stretch>
-            <a:fillRect/>
-          </a:stretch>
-        </p:blipFill>
-        <p:spPr>
-          <a:xfrm>
-            <a:off x="3973575" y="4164498"/>
-            <a:ext cx="400106" cy="133369"/>
-          </a:xfrm>
-          <a:prstGeom prst="rect">
-            <a:avLst/>
-          </a:prstGeom>
-        </p:spPr>
-      </p:pic>
-      <p:pic>
-        <p:nvPicPr>
-          <p:cNvPr id="48" name="Picture 47"/>
-          <p:cNvPicPr>
-            <a:picLocks noChangeAspect="1"/>
-          </p:cNvPicPr>
-          <p:nvPr/>
-        </p:nvPicPr>
-        <p:blipFill>
-          <a:blip r:embed="rId14"/>
-          <a:stretch>
-            <a:fillRect/>
-          </a:stretch>
-        </p:blipFill>
-        <p:spPr>
-          <a:xfrm>
-            <a:off x="4512011" y="2893277"/>
-            <a:ext cx="237393" cy="1371600"/>
-          </a:xfrm>
-          <a:prstGeom prst="rect">
-            <a:avLst/>
-          </a:prstGeom>
-        </p:spPr>
-      </p:pic>
-      <p:sp>
-        <p:nvSpPr>
-          <p:cNvPr id="55" name="Rectangle 54"/>
+          <a:noFill/>
+        </p:spPr>
+        <p:txBody>
+          <a:bodyPr wrap="square" rtlCol="0">
+            <a:spAutoFit/>
+          </a:bodyPr>
+          <a:lstStyle/>
+          <a:p>
+            <a:pPr>
+              <a:lnSpc>
+                <a:spcPts val="800"/>
+              </a:lnSpc>
+            </a:pPr>
+            <a:r>
+              <a:rPr lang="en-US" sz="900" dirty="0" smtClean="0"/>
+              <a:t>seq1</a:t>
+            </a:r>
+            <a:br>
+              <a:rPr lang="en-US" sz="900" dirty="0" smtClean="0"/>
+            </a:br>
+            <a:r>
+              <a:rPr lang="en-US" sz="900" dirty="0" smtClean="0"/>
+              <a:t>seq2</a:t>
+            </a:r>
+            <a:br>
+              <a:rPr lang="en-US" sz="900" dirty="0" smtClean="0"/>
+            </a:br>
+            <a:r>
+              <a:rPr lang="en-US" sz="900" dirty="0" smtClean="0"/>
+              <a:t>seq3</a:t>
+            </a:r>
+            <a:br>
+              <a:rPr lang="en-US" sz="900" dirty="0" smtClean="0"/>
+            </a:br>
+            <a:r>
+              <a:rPr lang="en-US" sz="900" dirty="0" smtClean="0"/>
+              <a:t>seq4</a:t>
+            </a:r>
+            <a:br>
+              <a:rPr lang="en-US" sz="900" dirty="0" smtClean="0"/>
+            </a:br>
+            <a:r>
+              <a:rPr lang="en-US" sz="900" dirty="0" smtClean="0"/>
+              <a:t>seq5</a:t>
+            </a:r>
+            <a:br>
+              <a:rPr lang="en-US" sz="900" dirty="0" smtClean="0"/>
+            </a:br>
+            <a:r>
+              <a:rPr lang="en-US" sz="900" dirty="0" smtClean="0"/>
+              <a:t>seq6</a:t>
+            </a:r>
+            <a:br>
+              <a:rPr lang="en-US" sz="900" dirty="0" smtClean="0"/>
+            </a:br>
+            <a:r>
+              <a:rPr lang="en-US" sz="900" dirty="0" smtClean="0"/>
+              <a:t>seq7</a:t>
+            </a:r>
+            <a:br>
+              <a:rPr lang="en-US" sz="900" dirty="0" smtClean="0"/>
+            </a:br>
+            <a:r>
+              <a:rPr lang="en-US" sz="900" dirty="0" smtClean="0"/>
+              <a:t>seq8</a:t>
+            </a:r>
+            <a:br>
+              <a:rPr lang="en-US" sz="900" dirty="0" smtClean="0"/>
+            </a:br>
+            <a:r>
+              <a:rPr lang="en-US" sz="900" dirty="0" smtClean="0"/>
+              <a:t>seq9</a:t>
+            </a:r>
+            <a:br>
+              <a:rPr lang="en-US" sz="900" dirty="0" smtClean="0"/>
+            </a:br>
+            <a:r>
+              <a:rPr lang="en-US" sz="900" dirty="0" smtClean="0"/>
+              <a:t>seq10</a:t>
+            </a:r>
+          </a:p>
+        </p:txBody>
+      </p:sp>
+      <p:sp>
+        <p:nvSpPr>
+          <p:cNvPr id="30" name="Rectangle 29"/>
           <p:cNvSpPr/>
           <p:nvPr/>
         </p:nvSpPr>
         <p:spPr>
           <a:xfrm>
-            <a:off x="4528120" y="3071839"/>
-            <a:ext cx="217334" cy="110573"/>
+            <a:off x="3967949" y="3206353"/>
+            <a:ext cx="54864" cy="54864"/>
           </a:xfrm>
           <a:prstGeom prst="rect">
             <a:avLst/>
           </a:prstGeom>
           <a:solidFill>
-            <a:schemeClr val="accent1">
-              <a:alpha val="40000"/>
-            </a:schemeClr>
+            <a:schemeClr val="accent1"/>
           </a:solidFill>
           <a:ln>
             <a:noFill/>
@@ -5324,22 +5431,20 @@
       </p:sp>
       <p:sp>
         <p:nvSpPr>
-          <p:cNvPr id="88" name="Rectangle 87"/>
+          <p:cNvPr id="95" name="Rectangle 94"/>
           <p:cNvSpPr/>
           <p:nvPr/>
         </p:nvSpPr>
         <p:spPr>
           <a:xfrm>
-            <a:off x="4534470" y="3884639"/>
-            <a:ext cx="217334" cy="110573"/>
+            <a:off x="3967949" y="3306663"/>
+            <a:ext cx="54864" cy="54864"/>
           </a:xfrm>
           <a:prstGeom prst="rect">
             <a:avLst/>
           </a:prstGeom>
           <a:solidFill>
-            <a:schemeClr val="accent6">
-              <a:alpha val="40000"/>
-            </a:schemeClr>
+            <a:schemeClr val="accent2"/>
           </a:solidFill>
           <a:ln>
             <a:noFill/>
@@ -5372,22 +5477,20 @@
       </p:sp>
       <p:sp>
         <p:nvSpPr>
-          <p:cNvPr id="89" name="Rectangle 88"/>
+          <p:cNvPr id="96" name="Rectangle 95"/>
           <p:cNvSpPr/>
           <p:nvPr/>
         </p:nvSpPr>
         <p:spPr>
           <a:xfrm>
-            <a:off x="4528120" y="3211539"/>
-            <a:ext cx="217334" cy="110573"/>
+            <a:off x="3967949" y="3408413"/>
+            <a:ext cx="54864" cy="54864"/>
           </a:xfrm>
           <a:prstGeom prst="rect">
             <a:avLst/>
           </a:prstGeom>
           <a:solidFill>
-            <a:schemeClr val="accent6">
-              <a:alpha val="40000"/>
-            </a:schemeClr>
+            <a:schemeClr val="accent3"/>
           </a:solidFill>
           <a:ln>
             <a:noFill/>
@@ -5420,22 +5523,20 @@
       </p:sp>
       <p:sp>
         <p:nvSpPr>
-          <p:cNvPr id="90" name="Rectangle 89"/>
+          <p:cNvPr id="97" name="Rectangle 96"/>
           <p:cNvSpPr/>
           <p:nvPr/>
         </p:nvSpPr>
         <p:spPr>
           <a:xfrm>
-            <a:off x="4528120" y="3338539"/>
-            <a:ext cx="217334" cy="110573"/>
+            <a:off x="3967949" y="3509510"/>
+            <a:ext cx="54864" cy="54864"/>
           </a:xfrm>
           <a:prstGeom prst="rect">
             <a:avLst/>
           </a:prstGeom>
           <a:solidFill>
-            <a:schemeClr val="accent6">
-              <a:alpha val="40000"/>
-            </a:schemeClr>
+            <a:schemeClr val="accent4"/>
           </a:solidFill>
           <a:ln>
             <a:noFill/>
@@ -5468,22 +5569,20 @@
       </p:sp>
       <p:sp>
         <p:nvSpPr>
-          <p:cNvPr id="91" name="Rectangle 90"/>
+          <p:cNvPr id="98" name="Rectangle 97"/>
           <p:cNvSpPr/>
           <p:nvPr/>
         </p:nvSpPr>
         <p:spPr>
           <a:xfrm>
-            <a:off x="4528120" y="4151339"/>
-            <a:ext cx="217334" cy="110573"/>
+            <a:off x="3970816" y="3609034"/>
+            <a:ext cx="54864" cy="54864"/>
           </a:xfrm>
           <a:prstGeom prst="rect">
             <a:avLst/>
           </a:prstGeom>
           <a:solidFill>
-            <a:schemeClr val="accent4">
-              <a:alpha val="40000"/>
-            </a:schemeClr>
+            <a:schemeClr val="accent5"/>
           </a:solidFill>
           <a:ln>
             <a:noFill/>
@@ -5511,6 +5610,678 @@
           <a:p>
             <a:pPr algn="ctr"/>
             <a:endParaRPr lang="en-US"/>
+          </a:p>
+        </p:txBody>
+      </p:sp>
+      <p:sp>
+        <p:nvSpPr>
+          <p:cNvPr id="99" name="Rectangle 98"/>
+          <p:cNvSpPr/>
+          <p:nvPr/>
+        </p:nvSpPr>
+        <p:spPr>
+          <a:xfrm>
+            <a:off x="3968676" y="3814349"/>
+            <a:ext cx="54864" cy="54864"/>
+          </a:xfrm>
+          <a:prstGeom prst="rect">
+            <a:avLst/>
+          </a:prstGeom>
+          <a:solidFill>
+            <a:schemeClr val="accent5">
+              <a:lumMod val="75000"/>
+            </a:schemeClr>
+          </a:solidFill>
+          <a:ln>
+            <a:noFill/>
+          </a:ln>
+        </p:spPr>
+        <p:style>
+          <a:lnRef idx="2">
+            <a:schemeClr val="accent1">
+              <a:shade val="50000"/>
+            </a:schemeClr>
+          </a:lnRef>
+          <a:fillRef idx="1">
+            <a:schemeClr val="accent1"/>
+          </a:fillRef>
+          <a:effectRef idx="0">
+            <a:schemeClr val="accent1"/>
+          </a:effectRef>
+          <a:fontRef idx="minor">
+            <a:schemeClr val="lt1"/>
+          </a:fontRef>
+        </p:style>
+        <p:txBody>
+          <a:bodyPr rtlCol="0" anchor="ctr"/>
+          <a:lstStyle/>
+          <a:p>
+            <a:pPr algn="ctr"/>
+            <a:endParaRPr lang="en-US"/>
+          </a:p>
+        </p:txBody>
+      </p:sp>
+      <p:sp>
+        <p:nvSpPr>
+          <p:cNvPr id="100" name="Rectangle 99"/>
+          <p:cNvSpPr/>
+          <p:nvPr/>
+        </p:nvSpPr>
+        <p:spPr>
+          <a:xfrm>
+            <a:off x="3967949" y="3714086"/>
+            <a:ext cx="54864" cy="54864"/>
+          </a:xfrm>
+          <a:prstGeom prst="rect">
+            <a:avLst/>
+          </a:prstGeom>
+          <a:solidFill>
+            <a:schemeClr val="accent6"/>
+          </a:solidFill>
+          <a:ln>
+            <a:noFill/>
+          </a:ln>
+        </p:spPr>
+        <p:style>
+          <a:lnRef idx="2">
+            <a:schemeClr val="accent1">
+              <a:shade val="50000"/>
+            </a:schemeClr>
+          </a:lnRef>
+          <a:fillRef idx="1">
+            <a:schemeClr val="accent1"/>
+          </a:fillRef>
+          <a:effectRef idx="0">
+            <a:schemeClr val="accent1"/>
+          </a:effectRef>
+          <a:fontRef idx="minor">
+            <a:schemeClr val="lt1"/>
+          </a:fontRef>
+        </p:style>
+        <p:txBody>
+          <a:bodyPr rtlCol="0" anchor="ctr"/>
+          <a:lstStyle/>
+          <a:p>
+            <a:pPr algn="ctr"/>
+            <a:endParaRPr lang="en-US"/>
+          </a:p>
+        </p:txBody>
+      </p:sp>
+      <p:sp>
+        <p:nvSpPr>
+          <p:cNvPr id="101" name="Rectangle 100"/>
+          <p:cNvSpPr/>
+          <p:nvPr/>
+        </p:nvSpPr>
+        <p:spPr>
+          <a:xfrm>
+            <a:off x="3967949" y="3910476"/>
+            <a:ext cx="54864" cy="54864"/>
+          </a:xfrm>
+          <a:prstGeom prst="rect">
+            <a:avLst/>
+          </a:prstGeom>
+          <a:solidFill>
+            <a:schemeClr val="accent2">
+              <a:lumMod val="75000"/>
+            </a:schemeClr>
+          </a:solidFill>
+          <a:ln>
+            <a:noFill/>
+          </a:ln>
+        </p:spPr>
+        <p:style>
+          <a:lnRef idx="2">
+            <a:schemeClr val="accent1">
+              <a:shade val="50000"/>
+            </a:schemeClr>
+          </a:lnRef>
+          <a:fillRef idx="1">
+            <a:schemeClr val="accent1"/>
+          </a:fillRef>
+          <a:effectRef idx="0">
+            <a:schemeClr val="accent1"/>
+          </a:effectRef>
+          <a:fontRef idx="minor">
+            <a:schemeClr val="lt1"/>
+          </a:fontRef>
+        </p:style>
+        <p:txBody>
+          <a:bodyPr rtlCol="0" anchor="ctr"/>
+          <a:lstStyle/>
+          <a:p>
+            <a:pPr algn="ctr"/>
+            <a:endParaRPr lang="en-US"/>
+          </a:p>
+        </p:txBody>
+      </p:sp>
+      <p:sp>
+        <p:nvSpPr>
+          <p:cNvPr id="102" name="Rectangle 101"/>
+          <p:cNvSpPr/>
+          <p:nvPr/>
+        </p:nvSpPr>
+        <p:spPr>
+          <a:xfrm>
+            <a:off x="3967949" y="4014183"/>
+            <a:ext cx="54864" cy="54864"/>
+          </a:xfrm>
+          <a:prstGeom prst="rect">
+            <a:avLst/>
+          </a:prstGeom>
+          <a:solidFill>
+            <a:schemeClr val="tx1">
+              <a:lumMod val="65000"/>
+              <a:lumOff val="35000"/>
+            </a:schemeClr>
+          </a:solidFill>
+          <a:ln>
+            <a:noFill/>
+          </a:ln>
+        </p:spPr>
+        <p:style>
+          <a:lnRef idx="2">
+            <a:schemeClr val="accent1">
+              <a:shade val="50000"/>
+            </a:schemeClr>
+          </a:lnRef>
+          <a:fillRef idx="1">
+            <a:schemeClr val="accent1"/>
+          </a:fillRef>
+          <a:effectRef idx="0">
+            <a:schemeClr val="accent1"/>
+          </a:effectRef>
+          <a:fontRef idx="minor">
+            <a:schemeClr val="lt1"/>
+          </a:fontRef>
+        </p:style>
+        <p:txBody>
+          <a:bodyPr rtlCol="0" anchor="ctr"/>
+          <a:lstStyle/>
+          <a:p>
+            <a:pPr algn="ctr"/>
+            <a:endParaRPr lang="en-US"/>
+          </a:p>
+        </p:txBody>
+      </p:sp>
+      <p:sp>
+        <p:nvSpPr>
+          <p:cNvPr id="103" name="Rectangle 102"/>
+          <p:cNvSpPr/>
+          <p:nvPr/>
+        </p:nvSpPr>
+        <p:spPr>
+          <a:xfrm>
+            <a:off x="3967949" y="4115500"/>
+            <a:ext cx="54864" cy="54864"/>
+          </a:xfrm>
+          <a:prstGeom prst="rect">
+            <a:avLst/>
+          </a:prstGeom>
+          <a:solidFill>
+            <a:schemeClr val="accent4">
+              <a:lumMod val="50000"/>
+            </a:schemeClr>
+          </a:solidFill>
+          <a:ln>
+            <a:noFill/>
+          </a:ln>
+        </p:spPr>
+        <p:style>
+          <a:lnRef idx="2">
+            <a:schemeClr val="accent1">
+              <a:shade val="50000"/>
+            </a:schemeClr>
+          </a:lnRef>
+          <a:fillRef idx="1">
+            <a:schemeClr val="accent1"/>
+          </a:fillRef>
+          <a:effectRef idx="0">
+            <a:schemeClr val="accent1"/>
+          </a:effectRef>
+          <a:fontRef idx="minor">
+            <a:schemeClr val="lt1"/>
+          </a:fontRef>
+        </p:style>
+        <p:txBody>
+          <a:bodyPr rtlCol="0" anchor="ctr"/>
+          <a:lstStyle/>
+          <a:p>
+            <a:pPr algn="ctr"/>
+            <a:endParaRPr lang="en-US"/>
+          </a:p>
+        </p:txBody>
+      </p:sp>
+      <p:sp>
+        <p:nvSpPr>
+          <p:cNvPr id="33" name="TextBox 32"/>
+          <p:cNvSpPr txBox="1"/>
+          <p:nvPr/>
+        </p:nvSpPr>
+        <p:spPr>
+          <a:xfrm>
+            <a:off x="2000401" y="3152354"/>
+            <a:ext cx="1724345" cy="230832"/>
+          </a:xfrm>
+          <a:prstGeom prst="rect">
+            <a:avLst/>
+          </a:prstGeom>
+          <a:solidFill>
+            <a:schemeClr val="bg1"/>
+          </a:solidFill>
+          <a:ln>
+            <a:noFill/>
+          </a:ln>
+        </p:spPr>
+        <p:txBody>
+          <a:bodyPr wrap="square" rtlCol="0">
+            <a:spAutoFit/>
+          </a:bodyPr>
+          <a:lstStyle/>
+          <a:p>
+            <a:r>
+              <a:rPr lang="en-US" sz="900" dirty="0"/>
+              <a:t>t</a:t>
+            </a:r>
+            <a:r>
+              <a:rPr lang="en-US" sz="900" dirty="0" smtClean="0"/>
+              <a:t>pm	              tpm</a:t>
+            </a:r>
+            <a:endParaRPr lang="en-US" sz="900" dirty="0"/>
+          </a:p>
+        </p:txBody>
+      </p:sp>
+      <p:sp>
+        <p:nvSpPr>
+          <p:cNvPr id="115" name="Rectangle 114"/>
+          <p:cNvSpPr/>
+          <p:nvPr/>
+        </p:nvSpPr>
+        <p:spPr>
+          <a:xfrm>
+            <a:off x="4417031" y="3474709"/>
+            <a:ext cx="246409" cy="91440"/>
+          </a:xfrm>
+          <a:prstGeom prst="rect">
+            <a:avLst/>
+          </a:prstGeom>
+          <a:solidFill>
+            <a:schemeClr val="accent1">
+              <a:lumMod val="60000"/>
+              <a:lumOff val="40000"/>
+              <a:alpha val="47000"/>
+            </a:schemeClr>
+          </a:solidFill>
+          <a:ln>
+            <a:noFill/>
+          </a:ln>
+          <a:effectLst/>
+        </p:spPr>
+        <p:style>
+          <a:lnRef idx="2">
+            <a:schemeClr val="accent1">
+              <a:shade val="50000"/>
+            </a:schemeClr>
+          </a:lnRef>
+          <a:fillRef idx="1">
+            <a:schemeClr val="accent1"/>
+          </a:fillRef>
+          <a:effectRef idx="0">
+            <a:schemeClr val="accent1"/>
+          </a:effectRef>
+          <a:fontRef idx="minor">
+            <a:schemeClr val="lt1"/>
+          </a:fontRef>
+        </p:style>
+        <p:txBody>
+          <a:bodyPr rtlCol="0" anchor="ctr"/>
+          <a:lstStyle/>
+          <a:p>
+            <a:pPr algn="ctr"/>
+            <a:endParaRPr lang="en-US"/>
+          </a:p>
+        </p:txBody>
+      </p:sp>
+      <p:sp>
+        <p:nvSpPr>
+          <p:cNvPr id="116" name="Rectangle 115"/>
+          <p:cNvSpPr/>
+          <p:nvPr/>
+        </p:nvSpPr>
+        <p:spPr>
+          <a:xfrm>
+            <a:off x="4417031" y="3573933"/>
+            <a:ext cx="246409" cy="91440"/>
+          </a:xfrm>
+          <a:prstGeom prst="rect">
+            <a:avLst/>
+          </a:prstGeom>
+          <a:solidFill>
+            <a:schemeClr val="accent1">
+              <a:lumMod val="75000"/>
+              <a:alpha val="47000"/>
+            </a:schemeClr>
+          </a:solidFill>
+          <a:ln>
+            <a:noFill/>
+          </a:ln>
+          <a:effectLst/>
+        </p:spPr>
+        <p:style>
+          <a:lnRef idx="2">
+            <a:schemeClr val="accent1">
+              <a:shade val="50000"/>
+            </a:schemeClr>
+          </a:lnRef>
+          <a:fillRef idx="1">
+            <a:schemeClr val="accent1"/>
+          </a:fillRef>
+          <a:effectRef idx="0">
+            <a:schemeClr val="accent1"/>
+          </a:effectRef>
+          <a:fontRef idx="minor">
+            <a:schemeClr val="lt1"/>
+          </a:fontRef>
+        </p:style>
+        <p:txBody>
+          <a:bodyPr rtlCol="0" anchor="ctr"/>
+          <a:lstStyle/>
+          <a:p>
+            <a:pPr algn="ctr"/>
+            <a:endParaRPr lang="en-US"/>
+          </a:p>
+        </p:txBody>
+      </p:sp>
+      <p:sp>
+        <p:nvSpPr>
+          <p:cNvPr id="117" name="Rectangle 116"/>
+          <p:cNvSpPr/>
+          <p:nvPr/>
+        </p:nvSpPr>
+        <p:spPr>
+          <a:xfrm>
+            <a:off x="4417770" y="3673068"/>
+            <a:ext cx="246409" cy="91440"/>
+          </a:xfrm>
+          <a:prstGeom prst="rect">
+            <a:avLst/>
+          </a:prstGeom>
+          <a:solidFill>
+            <a:schemeClr val="accent1">
+              <a:lumMod val="50000"/>
+              <a:alpha val="47000"/>
+            </a:schemeClr>
+          </a:solidFill>
+          <a:ln>
+            <a:noFill/>
+          </a:ln>
+          <a:effectLst/>
+        </p:spPr>
+        <p:style>
+          <a:lnRef idx="2">
+            <a:schemeClr val="accent1">
+              <a:shade val="50000"/>
+            </a:schemeClr>
+          </a:lnRef>
+          <a:fillRef idx="1">
+            <a:schemeClr val="accent1"/>
+          </a:fillRef>
+          <a:effectRef idx="0">
+            <a:schemeClr val="accent1"/>
+          </a:effectRef>
+          <a:fontRef idx="minor">
+            <a:schemeClr val="lt1"/>
+          </a:fontRef>
+        </p:style>
+        <p:txBody>
+          <a:bodyPr rtlCol="0" anchor="ctr"/>
+          <a:lstStyle/>
+          <a:p>
+            <a:pPr algn="ctr"/>
+            <a:endParaRPr lang="en-US"/>
+          </a:p>
+        </p:txBody>
+      </p:sp>
+      <p:sp>
+        <p:nvSpPr>
+          <p:cNvPr id="118" name="Rectangle 117"/>
+          <p:cNvSpPr/>
+          <p:nvPr/>
+        </p:nvSpPr>
+        <p:spPr>
+          <a:xfrm>
+            <a:off x="4417031" y="3982169"/>
+            <a:ext cx="246409" cy="91440"/>
+          </a:xfrm>
+          <a:prstGeom prst="rect">
+            <a:avLst/>
+          </a:prstGeom>
+          <a:solidFill>
+            <a:schemeClr val="accent1">
+              <a:lumMod val="40000"/>
+              <a:lumOff val="60000"/>
+              <a:alpha val="47000"/>
+            </a:schemeClr>
+          </a:solidFill>
+          <a:ln>
+            <a:noFill/>
+          </a:ln>
+          <a:effectLst/>
+        </p:spPr>
+        <p:style>
+          <a:lnRef idx="2">
+            <a:schemeClr val="accent1">
+              <a:shade val="50000"/>
+            </a:schemeClr>
+          </a:lnRef>
+          <a:fillRef idx="1">
+            <a:schemeClr val="accent1"/>
+          </a:fillRef>
+          <a:effectRef idx="0">
+            <a:schemeClr val="accent1"/>
+          </a:effectRef>
+          <a:fontRef idx="minor">
+            <a:schemeClr val="lt1"/>
+          </a:fontRef>
+        </p:style>
+        <p:txBody>
+          <a:bodyPr rtlCol="0" anchor="ctr"/>
+          <a:lstStyle/>
+          <a:p>
+            <a:pPr algn="ctr"/>
+            <a:endParaRPr lang="en-US"/>
+          </a:p>
+        </p:txBody>
+      </p:sp>
+      <p:sp>
+        <p:nvSpPr>
+          <p:cNvPr id="119" name="Rectangle 118"/>
+          <p:cNvSpPr/>
+          <p:nvPr/>
+        </p:nvSpPr>
+        <p:spPr>
+          <a:xfrm>
+            <a:off x="4415761" y="4084512"/>
+            <a:ext cx="246409" cy="91440"/>
+          </a:xfrm>
+          <a:prstGeom prst="rect">
+            <a:avLst/>
+          </a:prstGeom>
+          <a:solidFill>
+            <a:schemeClr val="accent1">
+              <a:lumMod val="60000"/>
+              <a:lumOff val="40000"/>
+              <a:alpha val="47000"/>
+            </a:schemeClr>
+          </a:solidFill>
+          <a:ln>
+            <a:noFill/>
+          </a:ln>
+          <a:effectLst/>
+        </p:spPr>
+        <p:style>
+          <a:lnRef idx="2">
+            <a:schemeClr val="accent1">
+              <a:shade val="50000"/>
+            </a:schemeClr>
+          </a:lnRef>
+          <a:fillRef idx="1">
+            <a:schemeClr val="accent1"/>
+          </a:fillRef>
+          <a:effectRef idx="0">
+            <a:schemeClr val="accent1"/>
+          </a:effectRef>
+          <a:fontRef idx="minor">
+            <a:schemeClr val="lt1"/>
+          </a:fontRef>
+        </p:style>
+        <p:txBody>
+          <a:bodyPr rtlCol="0" anchor="ctr"/>
+          <a:lstStyle/>
+          <a:p>
+            <a:pPr algn="ctr"/>
+            <a:endParaRPr lang="en-US"/>
+          </a:p>
+        </p:txBody>
+      </p:sp>
+      <p:sp>
+        <p:nvSpPr>
+          <p:cNvPr id="6" name="TextBox 5"/>
+          <p:cNvSpPr txBox="1"/>
+          <p:nvPr/>
+        </p:nvSpPr>
+        <p:spPr>
+          <a:xfrm>
+            <a:off x="4339933" y="3028144"/>
+            <a:ext cx="364796" cy="1225657"/>
+          </a:xfrm>
+          <a:prstGeom prst="rect">
+            <a:avLst/>
+          </a:prstGeom>
+          <a:noFill/>
+        </p:spPr>
+        <p:txBody>
+          <a:bodyPr wrap="square" rtlCol="0">
+            <a:spAutoFit/>
+          </a:bodyPr>
+          <a:lstStyle/>
+          <a:p>
+            <a:pPr algn="r">
+              <a:lnSpc>
+                <a:spcPts val="800"/>
+              </a:lnSpc>
+            </a:pPr>
+            <a:r>
+              <a:rPr lang="en-US" sz="900" dirty="0"/>
+              <a:t/>
+            </a:r>
+            <a:br>
+              <a:rPr lang="en-US" sz="900" dirty="0"/>
+            </a:br>
+            <a:r>
+              <a:rPr lang="en-US" sz="900" dirty="0"/>
+              <a:t>2.0</a:t>
+            </a:r>
+            <a:br>
+              <a:rPr lang="en-US" sz="900" dirty="0"/>
+            </a:br>
+            <a:r>
+              <a:rPr lang="en-US" sz="900" dirty="0" smtClean="0"/>
+              <a:t>1.5</a:t>
+            </a:r>
+            <a:r>
+              <a:rPr lang="en-US" sz="900" dirty="0"/>
+              <a:t/>
+            </a:r>
+            <a:br>
+              <a:rPr lang="en-US" sz="900" dirty="0"/>
+            </a:br>
+            <a:r>
+              <a:rPr lang="en-US" sz="900" dirty="0" smtClean="0"/>
+              <a:t>0.4</a:t>
+            </a:r>
+            <a:r>
+              <a:rPr lang="en-US" sz="900" dirty="0"/>
+              <a:t/>
+            </a:r>
+            <a:br>
+              <a:rPr lang="en-US" sz="900" dirty="0"/>
+            </a:br>
+            <a:r>
+              <a:rPr lang="en-US" sz="900" dirty="0" smtClean="0"/>
+              <a:t>-1.4</a:t>
+            </a:r>
+            <a:r>
+              <a:rPr lang="en-US" sz="900" dirty="0"/>
+              <a:t/>
+            </a:r>
+            <a:br>
+              <a:rPr lang="en-US" sz="900" dirty="0"/>
+            </a:br>
+            <a:r>
+              <a:rPr lang="en-US" sz="900" dirty="0" smtClean="0"/>
+              <a:t>-1.9</a:t>
+            </a:r>
+            <a:endParaRPr lang="en-US" sz="900" dirty="0"/>
+          </a:p>
+          <a:p>
+            <a:pPr algn="r">
+              <a:lnSpc>
+                <a:spcPts val="800"/>
+              </a:lnSpc>
+            </a:pPr>
+            <a:r>
+              <a:rPr lang="en-US" sz="900" dirty="0"/>
+              <a:t>-</a:t>
+            </a:r>
+            <a:r>
+              <a:rPr lang="en-US" sz="900" dirty="0" smtClean="0"/>
+              <a:t>2.1</a:t>
+            </a:r>
+            <a:endParaRPr lang="en-US" sz="900" dirty="0"/>
+          </a:p>
+          <a:p>
+            <a:pPr algn="r">
+              <a:lnSpc>
+                <a:spcPts val="800"/>
+              </a:lnSpc>
+            </a:pPr>
+            <a:r>
+              <a:rPr lang="en-US" sz="900" dirty="0" smtClean="0"/>
+              <a:t>2.2</a:t>
+            </a:r>
+            <a:endParaRPr lang="en-US" sz="900" dirty="0"/>
+          </a:p>
+          <a:p>
+            <a:pPr algn="r">
+              <a:lnSpc>
+                <a:spcPts val="800"/>
+              </a:lnSpc>
+            </a:pPr>
+            <a:r>
+              <a:rPr lang="en-US" sz="900" dirty="0" smtClean="0"/>
+              <a:t>2.4</a:t>
+            </a:r>
+            <a:endParaRPr lang="en-US" sz="900" dirty="0"/>
+          </a:p>
+          <a:p>
+            <a:pPr algn="r">
+              <a:lnSpc>
+                <a:spcPts val="800"/>
+              </a:lnSpc>
+            </a:pPr>
+            <a:r>
+              <a:rPr lang="en-US" sz="900" dirty="0" smtClean="0"/>
+              <a:t>-1.2</a:t>
+            </a:r>
+            <a:br>
+              <a:rPr lang="en-US" sz="900" dirty="0" smtClean="0"/>
+            </a:br>
+            <a:r>
+              <a:rPr lang="en-US" sz="900" dirty="0" smtClean="0"/>
+              <a:t>-1.3</a:t>
+            </a:r>
+            <a:endParaRPr lang="en-US" sz="900" dirty="0"/>
           </a:p>
         </p:txBody>
       </p:sp>
@@ -5856,6 +6627,21 @@
 </file>
 
 <file path=customXml/item1.xml><?xml version="1.0" encoding="utf-8"?>
+<p:properties xmlns:p="http://schemas.microsoft.com/office/2006/metadata/properties" xmlns:xsi="http://www.w3.org/2001/XMLSchema-instance" xmlns:pc="http://schemas.microsoft.com/office/infopath/2007/PartnerControls">
+  <documentManagement/>
+</p:properties>
+</file>
+
+<file path=customXml/item2.xml><?xml version="1.0" encoding="utf-8"?>
+<?mso-contentType ?>
+<FormTemplates xmlns="http://schemas.microsoft.com/sharepoint/v3/contenttype/forms">
+  <Display>DocumentLibraryForm</Display>
+  <Edit>DocumentLibraryForm</Edit>
+  <New>DocumentLibraryForm</New>
+</FormTemplates>
+</file>
+
+<file path=customXml/item3.xml><?xml version="1.0" encoding="utf-8"?>
 <ct:contentTypeSchema xmlns:ct="http://schemas.microsoft.com/office/2006/metadata/contentType" xmlns:ma="http://schemas.microsoft.com/office/2006/metadata/properties/metaAttributes" ct:_="" ma:_="" ma:contentTypeName="Document" ma:contentTypeID="0x0101003B386B74BDD8AE4F897146AB15D0504F" ma:contentTypeVersion="11" ma:contentTypeDescription="Create a new document." ma:contentTypeScope="" ma:versionID="f314fc19cc81757bd9a72bbba36950ef">
   <xsd:schema xmlns:xsd="http://www.w3.org/2001/XMLSchema" xmlns:xs="http://www.w3.org/2001/XMLSchema" xmlns:p="http://schemas.microsoft.com/office/2006/metadata/properties" xmlns:ns3="9d71dc66-2ce2-4fa7-946a-79ef4f85df34" targetNamespace="http://schemas.microsoft.com/office/2006/metadata/properties" ma:root="true" ma:fieldsID="88fcfec987f7442b6217093e550796dd" ns3:_="">
     <xsd:import namespace="9d71dc66-2ce2-4fa7-946a-79ef4f85df34"/>
@@ -6045,22 +6831,31 @@
 </ct:contentTypeSchema>
 </file>
 
-<file path=customXml/item2.xml><?xml version="1.0" encoding="utf-8"?>
-<?mso-contentType ?>
-<FormTemplates xmlns="http://schemas.microsoft.com/sharepoint/v3/contenttype/forms">
-  <Display>DocumentLibraryForm</Display>
-  <Edit>DocumentLibraryForm</Edit>
-  <New>DocumentLibraryForm</New>
-</FormTemplates>
+<file path=customXml/itemProps1.xml><?xml version="1.0" encoding="utf-8"?>
+<ds:datastoreItem xmlns:ds="http://schemas.openxmlformats.org/officeDocument/2006/customXml" ds:itemID="{4E5BCBCC-D124-48EF-86DD-41B5B9A9E644}">
+  <ds:schemaRefs>
+    <ds:schemaRef ds:uri="http://purl.org/dc/elements/1.1/"/>
+    <ds:schemaRef ds:uri="http://schemas.microsoft.com/office/2006/metadata/properties"/>
+    <ds:schemaRef ds:uri="http://purl.org/dc/terms/"/>
+    <ds:schemaRef ds:uri="http://schemas.openxmlformats.org/package/2006/metadata/core-properties"/>
+    <ds:schemaRef ds:uri="9d71dc66-2ce2-4fa7-946a-79ef4f85df34"/>
+    <ds:schemaRef ds:uri="http://schemas.microsoft.com/office/2006/documentManagement/types"/>
+    <ds:schemaRef ds:uri="http://schemas.microsoft.com/office/infopath/2007/PartnerControls"/>
+    <ds:schemaRef ds:uri="http://www.w3.org/XML/1998/namespace"/>
+    <ds:schemaRef ds:uri="http://purl.org/dc/dcmitype/"/>
+  </ds:schemaRefs>
+</ds:datastoreItem>
 </file>
 
-<file path=customXml/item3.xml><?xml version="1.0" encoding="utf-8"?>
-<p:properties xmlns:p="http://schemas.microsoft.com/office/2006/metadata/properties" xmlns:xsi="http://www.w3.org/2001/XMLSchema-instance" xmlns:pc="http://schemas.microsoft.com/office/infopath/2007/PartnerControls">
-  <documentManagement/>
-</p:properties>
+<file path=customXml/itemProps2.xml><?xml version="1.0" encoding="utf-8"?>
+<ds:datastoreItem xmlns:ds="http://schemas.openxmlformats.org/officeDocument/2006/customXml" ds:itemID="{99DF0768-79C0-4973-A121-8A23343637D6}">
+  <ds:schemaRefs>
+    <ds:schemaRef ds:uri="http://schemas.microsoft.com/sharepoint/v3/contenttype/forms"/>
+  </ds:schemaRefs>
+</ds:datastoreItem>
 </file>
 
-<file path=customXml/itemProps1.xml><?xml version="1.0" encoding="utf-8"?>
+<file path=customXml/itemProps3.xml><?xml version="1.0" encoding="utf-8"?>
 <ds:datastoreItem xmlns:ds="http://schemas.openxmlformats.org/officeDocument/2006/customXml" ds:itemID="{47B0250F-D484-4D0C-8B21-1C703FD40B5E}">
   <ds:schemaRefs>
     <ds:schemaRef ds:uri="http://schemas.microsoft.com/office/2006/metadata/contentType"/>
@@ -6076,28 +6871,4 @@
     <ds:schemaRef ds:uri="http://schemas.microsoft.com/internal/obd"/>
   </ds:schemaRefs>
 </ds:datastoreItem>
-</file>
-
-<file path=customXml/itemProps2.xml><?xml version="1.0" encoding="utf-8"?>
-<ds:datastoreItem xmlns:ds="http://schemas.openxmlformats.org/officeDocument/2006/customXml" ds:itemID="{99DF0768-79C0-4973-A121-8A23343637D6}">
-  <ds:schemaRefs>
-    <ds:schemaRef ds:uri="http://schemas.microsoft.com/sharepoint/v3/contenttype/forms"/>
-  </ds:schemaRefs>
-</ds:datastoreItem>
-</file>
-
-<file path=customXml/itemProps3.xml><?xml version="1.0" encoding="utf-8"?>
-<ds:datastoreItem xmlns:ds="http://schemas.openxmlformats.org/officeDocument/2006/customXml" ds:itemID="{4E5BCBCC-D124-48EF-86DD-41B5B9A9E644}">
-  <ds:schemaRefs>
-    <ds:schemaRef ds:uri="http://schemas.microsoft.com/office/2006/documentManagement/types"/>
-    <ds:schemaRef ds:uri="http://schemas.openxmlformats.org/package/2006/metadata/core-properties"/>
-    <ds:schemaRef ds:uri="9d71dc66-2ce2-4fa7-946a-79ef4f85df34"/>
-    <ds:schemaRef ds:uri="http://purl.org/dc/dcmitype/"/>
-    <ds:schemaRef ds:uri="http://schemas.microsoft.com/office/infopath/2007/PartnerControls"/>
-    <ds:schemaRef ds:uri="http://purl.org/dc/elements/1.1/"/>
-    <ds:schemaRef ds:uri="http://schemas.microsoft.com/office/2006/metadata/properties"/>
-    <ds:schemaRef ds:uri="http://www.w3.org/XML/1998/namespace"/>
-    <ds:schemaRef ds:uri="http://purl.org/dc/terms/"/>
-  </ds:schemaRefs>
-</ds:datastoreItem>
 </file>
</xml_diff>

<commit_message>
Lots of figure updates
</commit_message>
<xml_diff>
--- a/Figure 1/Fig.1A.pptx
+++ b/Figure 1/Fig.1A.pptx
@@ -255,7 +255,7 @@
           <a:p>
             <a:fld id="{377E1556-387F-4C4D-9CCC-E001782B76BD}" type="datetimeFigureOut">
               <a:rPr lang="en-US" smtClean="0"/>
-              <a:t>1/14/2022</a:t>
+              <a:t>3/14/2022</a:t>
             </a:fld>
             <a:endParaRPr lang="en-US"/>
           </a:p>
@@ -425,7 +425,7 @@
           <a:p>
             <a:fld id="{377E1556-387F-4C4D-9CCC-E001782B76BD}" type="datetimeFigureOut">
               <a:rPr lang="en-US" smtClean="0"/>
-              <a:t>1/14/2022</a:t>
+              <a:t>3/14/2022</a:t>
             </a:fld>
             <a:endParaRPr lang="en-US"/>
           </a:p>
@@ -605,7 +605,7 @@
           <a:p>
             <a:fld id="{377E1556-387F-4C4D-9CCC-E001782B76BD}" type="datetimeFigureOut">
               <a:rPr lang="en-US" smtClean="0"/>
-              <a:t>1/14/2022</a:t>
+              <a:t>3/14/2022</a:t>
             </a:fld>
             <a:endParaRPr lang="en-US"/>
           </a:p>
@@ -775,7 +775,7 @@
           <a:p>
             <a:fld id="{377E1556-387F-4C4D-9CCC-E001782B76BD}" type="datetimeFigureOut">
               <a:rPr lang="en-US" smtClean="0"/>
-              <a:t>1/14/2022</a:t>
+              <a:t>3/14/2022</a:t>
             </a:fld>
             <a:endParaRPr lang="en-US"/>
           </a:p>
@@ -1021,7 +1021,7 @@
           <a:p>
             <a:fld id="{377E1556-387F-4C4D-9CCC-E001782B76BD}" type="datetimeFigureOut">
               <a:rPr lang="en-US" smtClean="0"/>
-              <a:t>1/14/2022</a:t>
+              <a:t>3/14/2022</a:t>
             </a:fld>
             <a:endParaRPr lang="en-US"/>
           </a:p>
@@ -1253,7 +1253,7 @@
           <a:p>
             <a:fld id="{377E1556-387F-4C4D-9CCC-E001782B76BD}" type="datetimeFigureOut">
               <a:rPr lang="en-US" smtClean="0"/>
-              <a:t>1/14/2022</a:t>
+              <a:t>3/14/2022</a:t>
             </a:fld>
             <a:endParaRPr lang="en-US"/>
           </a:p>
@@ -1620,7 +1620,7 @@
           <a:p>
             <a:fld id="{377E1556-387F-4C4D-9CCC-E001782B76BD}" type="datetimeFigureOut">
               <a:rPr lang="en-US" smtClean="0"/>
-              <a:t>1/14/2022</a:t>
+              <a:t>3/14/2022</a:t>
             </a:fld>
             <a:endParaRPr lang="en-US"/>
           </a:p>
@@ -1738,7 +1738,7 @@
           <a:p>
             <a:fld id="{377E1556-387F-4C4D-9CCC-E001782B76BD}" type="datetimeFigureOut">
               <a:rPr lang="en-US" smtClean="0"/>
-              <a:t>1/14/2022</a:t>
+              <a:t>3/14/2022</a:t>
             </a:fld>
             <a:endParaRPr lang="en-US"/>
           </a:p>
@@ -1833,7 +1833,7 @@
           <a:p>
             <a:fld id="{377E1556-387F-4C4D-9CCC-E001782B76BD}" type="datetimeFigureOut">
               <a:rPr lang="en-US" smtClean="0"/>
-              <a:t>1/14/2022</a:t>
+              <a:t>3/14/2022</a:t>
             </a:fld>
             <a:endParaRPr lang="en-US"/>
           </a:p>
@@ -2110,7 +2110,7 @@
           <a:p>
             <a:fld id="{377E1556-387F-4C4D-9CCC-E001782B76BD}" type="datetimeFigureOut">
               <a:rPr lang="en-US" smtClean="0"/>
-              <a:t>1/14/2022</a:t>
+              <a:t>3/14/2022</a:t>
             </a:fld>
             <a:endParaRPr lang="en-US"/>
           </a:p>
@@ -2363,7 +2363,7 @@
           <a:p>
             <a:fld id="{377E1556-387F-4C4D-9CCC-E001782B76BD}" type="datetimeFigureOut">
               <a:rPr lang="en-US" smtClean="0"/>
-              <a:t>1/14/2022</a:t>
+              <a:t>3/14/2022</a:t>
             </a:fld>
             <a:endParaRPr lang="en-US"/>
           </a:p>
@@ -2576,7 +2576,7 @@
           <a:p>
             <a:fld id="{377E1556-387F-4C4D-9CCC-E001782B76BD}" type="datetimeFigureOut">
               <a:rPr lang="en-US" smtClean="0"/>
-              <a:t>1/14/2022</a:t>
+              <a:t>3/14/2022</a:t>
             </a:fld>
             <a:endParaRPr lang="en-US"/>
           </a:p>
@@ -2981,6 +2981,186 @@
           <a:chExt cx="0" cy="0"/>
         </a:xfrm>
       </p:grpSpPr>
+      <p:pic>
+        <p:nvPicPr>
+          <p:cNvPr id="13" name="Picture 12"/>
+          <p:cNvPicPr>
+            <a:picLocks noChangeAspect="1"/>
+          </p:cNvPicPr>
+          <p:nvPr/>
+        </p:nvPicPr>
+        <p:blipFill rotWithShape="1">
+          <a:blip r:embed="rId2"/>
+          <a:srcRect b="22130"/>
+          <a:stretch/>
+        </p:blipFill>
+        <p:spPr>
+          <a:xfrm>
+            <a:off x="1490516" y="3151098"/>
+            <a:ext cx="1400528" cy="871481"/>
+          </a:xfrm>
+          <a:prstGeom prst="rect">
+            <a:avLst/>
+          </a:prstGeom>
+        </p:spPr>
+      </p:pic>
+      <p:pic>
+        <p:nvPicPr>
+          <p:cNvPr id="15" name="Picture 14"/>
+          <p:cNvPicPr>
+            <a:picLocks noChangeAspect="1"/>
+          </p:cNvPicPr>
+          <p:nvPr/>
+        </p:nvPicPr>
+        <p:blipFill rotWithShape="1">
+          <a:blip r:embed="rId3"/>
+          <a:srcRect l="25788" b="24090"/>
+          <a:stretch/>
+        </p:blipFill>
+        <p:spPr>
+          <a:xfrm>
+            <a:off x="3109387" y="3198907"/>
+            <a:ext cx="1034193" cy="819606"/>
+          </a:xfrm>
+          <a:prstGeom prst="rect">
+            <a:avLst/>
+          </a:prstGeom>
+        </p:spPr>
+      </p:pic>
+      <p:sp>
+        <p:nvSpPr>
+          <p:cNvPr id="33" name="TextBox 32"/>
+          <p:cNvSpPr txBox="1"/>
+          <p:nvPr/>
+        </p:nvSpPr>
+        <p:spPr>
+          <a:xfrm>
+            <a:off x="1874736" y="3138168"/>
+            <a:ext cx="1872718" cy="230832"/>
+          </a:xfrm>
+          <a:prstGeom prst="rect">
+            <a:avLst/>
+          </a:prstGeom>
+          <a:solidFill>
+            <a:schemeClr val="bg1"/>
+          </a:solidFill>
+          <a:ln>
+            <a:noFill/>
+          </a:ln>
+        </p:spPr>
+        <p:txBody>
+          <a:bodyPr wrap="square" rtlCol="0">
+            <a:spAutoFit/>
+          </a:bodyPr>
+          <a:lstStyle/>
+          <a:p>
+            <a:r>
+              <a:rPr lang="en-US" sz="900" dirty="0"/>
+              <a:t>t</a:t>
+            </a:r>
+            <a:r>
+              <a:rPr lang="en-US" sz="900" dirty="0" smtClean="0"/>
+              <a:t>pm (transcripts/million)          tpm</a:t>
+            </a:r>
+            <a:endParaRPr lang="en-US" sz="900" dirty="0"/>
+          </a:p>
+        </p:txBody>
+      </p:sp>
+      <p:sp>
+        <p:nvSpPr>
+          <p:cNvPr id="144" name="Oval 143"/>
+          <p:cNvSpPr/>
+          <p:nvPr/>
+        </p:nvSpPr>
+        <p:spPr>
+          <a:xfrm>
+            <a:off x="3802726" y="1501432"/>
+            <a:ext cx="182880" cy="182880"/>
+          </a:xfrm>
+          <a:prstGeom prst="ellipse">
+            <a:avLst/>
+          </a:prstGeom>
+          <a:noFill/>
+          <a:ln w="9525">
+            <a:solidFill>
+              <a:schemeClr val="tx1"/>
+            </a:solidFill>
+            <a:prstDash val="solid"/>
+          </a:ln>
+        </p:spPr>
+        <p:style>
+          <a:lnRef idx="2">
+            <a:schemeClr val="accent1">
+              <a:shade val="50000"/>
+            </a:schemeClr>
+          </a:lnRef>
+          <a:fillRef idx="1">
+            <a:schemeClr val="accent1"/>
+          </a:fillRef>
+          <a:effectRef idx="0">
+            <a:schemeClr val="accent1"/>
+          </a:effectRef>
+          <a:fontRef idx="minor">
+            <a:schemeClr val="lt1"/>
+          </a:fontRef>
+        </p:style>
+        <p:txBody>
+          <a:bodyPr rtlCol="0" anchor="ctr"/>
+          <a:lstStyle/>
+          <a:p>
+            <a:pPr algn="ctr"/>
+            <a:endParaRPr lang="en-US"/>
+          </a:p>
+        </p:txBody>
+      </p:sp>
+      <p:sp>
+        <p:nvSpPr>
+          <p:cNvPr id="131" name="Rectangle 130"/>
+          <p:cNvSpPr/>
+          <p:nvPr/>
+        </p:nvSpPr>
+        <p:spPr>
+          <a:xfrm rot="1620000">
+            <a:off x="3892549" y="1502854"/>
+            <a:ext cx="100584" cy="27432"/>
+          </a:xfrm>
+          <a:prstGeom prst="rect">
+            <a:avLst/>
+          </a:prstGeom>
+          <a:solidFill>
+            <a:schemeClr val="accent4">
+              <a:lumMod val="50000"/>
+            </a:schemeClr>
+          </a:solidFill>
+          <a:ln>
+            <a:noFill/>
+          </a:ln>
+        </p:spPr>
+        <p:style>
+          <a:lnRef idx="2">
+            <a:schemeClr val="accent1">
+              <a:shade val="50000"/>
+            </a:schemeClr>
+          </a:lnRef>
+          <a:fillRef idx="1">
+            <a:schemeClr val="accent1"/>
+          </a:fillRef>
+          <a:effectRef idx="0">
+            <a:schemeClr val="accent1"/>
+          </a:effectRef>
+          <a:fontRef idx="minor">
+            <a:schemeClr val="lt1"/>
+          </a:fontRef>
+        </p:style>
+        <p:txBody>
+          <a:bodyPr rtlCol="0" anchor="ctr"/>
+          <a:lstStyle/>
+          <a:p>
+            <a:pPr algn="ctr"/>
+            <a:endParaRPr lang="en-US"/>
+          </a:p>
+        </p:txBody>
+      </p:sp>
       <p:sp>
         <p:nvSpPr>
           <p:cNvPr id="114" name="Rectangle 113"/>
@@ -3270,7 +3450,7 @@
         </p:nvSpPr>
         <p:spPr>
           <a:xfrm>
-            <a:off x="1796482" y="1362116"/>
+            <a:off x="1788862" y="1377356"/>
             <a:ext cx="1112805" cy="276999"/>
           </a:xfrm>
           <a:prstGeom prst="rect">
@@ -3370,301 +3550,6 @@
           </a:p>
         </p:txBody>
       </p:sp>
-      <p:grpSp>
-        <p:nvGrpSpPr>
-          <p:cNvPr id="110" name="Group 109"/>
-          <p:cNvGrpSpPr/>
-          <p:nvPr/>
-        </p:nvGrpSpPr>
-        <p:grpSpPr>
-          <a:xfrm>
-            <a:off x="3160662" y="1172387"/>
-            <a:ext cx="614001" cy="136045"/>
-            <a:chOff x="3230914" y="779204"/>
-            <a:chExt cx="614001" cy="136045"/>
-          </a:xfrm>
-        </p:grpSpPr>
-        <p:cxnSp>
-          <p:nvCxnSpPr>
-            <p:cNvPr id="16" name="Straight Connector 15"/>
-            <p:cNvCxnSpPr/>
-            <p:nvPr/>
-          </p:nvCxnSpPr>
-          <p:spPr>
-            <a:xfrm>
-              <a:off x="3230914" y="779204"/>
-              <a:ext cx="237741" cy="0"/>
-            </a:xfrm>
-            <a:prstGeom prst="line">
-              <a:avLst/>
-            </a:prstGeom>
-            <a:ln w="12700">
-              <a:solidFill>
-                <a:srgbClr val="FF0000"/>
-              </a:solidFill>
-            </a:ln>
-          </p:spPr>
-          <p:style>
-            <a:lnRef idx="1">
-              <a:schemeClr val="accent1"/>
-            </a:lnRef>
-            <a:fillRef idx="0">
-              <a:schemeClr val="accent1"/>
-            </a:fillRef>
-            <a:effectRef idx="0">
-              <a:schemeClr val="accent1"/>
-            </a:effectRef>
-            <a:fontRef idx="minor">
-              <a:schemeClr val="tx1"/>
-            </a:fontRef>
-          </p:style>
-        </p:cxnSp>
-        <p:cxnSp>
-          <p:nvCxnSpPr>
-            <p:cNvPr id="23" name="Straight Connector 22"/>
-            <p:cNvCxnSpPr/>
-            <p:nvPr/>
-          </p:nvCxnSpPr>
-          <p:spPr>
-            <a:xfrm>
-              <a:off x="3451133" y="821306"/>
-              <a:ext cx="237741" cy="0"/>
-            </a:xfrm>
-            <a:prstGeom prst="line">
-              <a:avLst/>
-            </a:prstGeom>
-            <a:ln w="12700">
-              <a:solidFill>
-                <a:srgbClr val="FF0000"/>
-              </a:solidFill>
-            </a:ln>
-          </p:spPr>
-          <p:style>
-            <a:lnRef idx="1">
-              <a:schemeClr val="accent1"/>
-            </a:lnRef>
-            <a:fillRef idx="0">
-              <a:schemeClr val="accent1"/>
-            </a:fillRef>
-            <a:effectRef idx="0">
-              <a:schemeClr val="accent1"/>
-            </a:effectRef>
-            <a:fontRef idx="minor">
-              <a:schemeClr val="tx1"/>
-            </a:fontRef>
-          </p:style>
-        </p:cxnSp>
-        <p:cxnSp>
-          <p:nvCxnSpPr>
-            <p:cNvPr id="24" name="Straight Connector 23"/>
-            <p:cNvCxnSpPr/>
-            <p:nvPr/>
-          </p:nvCxnSpPr>
-          <p:spPr>
-            <a:xfrm>
-              <a:off x="3529059" y="852025"/>
-              <a:ext cx="237741" cy="0"/>
-            </a:xfrm>
-            <a:prstGeom prst="line">
-              <a:avLst/>
-            </a:prstGeom>
-            <a:ln w="12700">
-              <a:solidFill>
-                <a:srgbClr val="FF0000"/>
-              </a:solidFill>
-            </a:ln>
-          </p:spPr>
-          <p:style>
-            <a:lnRef idx="1">
-              <a:schemeClr val="accent1"/>
-            </a:lnRef>
-            <a:fillRef idx="0">
-              <a:schemeClr val="accent1"/>
-            </a:fillRef>
-            <a:effectRef idx="0">
-              <a:schemeClr val="accent1"/>
-            </a:effectRef>
-            <a:fontRef idx="minor">
-              <a:schemeClr val="tx1"/>
-            </a:fontRef>
-          </p:style>
-        </p:cxnSp>
-        <p:cxnSp>
-          <p:nvCxnSpPr>
-            <p:cNvPr id="25" name="Straight Connector 24"/>
-            <p:cNvCxnSpPr/>
-            <p:nvPr/>
-          </p:nvCxnSpPr>
-          <p:spPr>
-            <a:xfrm>
-              <a:off x="3607174" y="877874"/>
-              <a:ext cx="237741" cy="0"/>
-            </a:xfrm>
-            <a:prstGeom prst="line">
-              <a:avLst/>
-            </a:prstGeom>
-            <a:ln w="12700">
-              <a:solidFill>
-                <a:srgbClr val="FF0000"/>
-              </a:solidFill>
-            </a:ln>
-          </p:spPr>
-          <p:style>
-            <a:lnRef idx="1">
-              <a:schemeClr val="accent1"/>
-            </a:lnRef>
-            <a:fillRef idx="0">
-              <a:schemeClr val="accent1"/>
-            </a:fillRef>
-            <a:effectRef idx="0">
-              <a:schemeClr val="accent1"/>
-            </a:effectRef>
-            <a:fontRef idx="minor">
-              <a:schemeClr val="tx1"/>
-            </a:fontRef>
-          </p:style>
-        </p:cxnSp>
-        <p:cxnSp>
-          <p:nvCxnSpPr>
-            <p:cNvPr id="26" name="Straight Connector 25"/>
-            <p:cNvCxnSpPr/>
-            <p:nvPr/>
-          </p:nvCxnSpPr>
-          <p:spPr>
-            <a:xfrm>
-              <a:off x="3485792" y="915249"/>
-              <a:ext cx="237741" cy="0"/>
-            </a:xfrm>
-            <a:prstGeom prst="line">
-              <a:avLst/>
-            </a:prstGeom>
-            <a:ln w="12700">
-              <a:solidFill>
-                <a:srgbClr val="FF0000"/>
-              </a:solidFill>
-            </a:ln>
-          </p:spPr>
-          <p:style>
-            <a:lnRef idx="1">
-              <a:schemeClr val="accent1"/>
-            </a:lnRef>
-            <a:fillRef idx="0">
-              <a:schemeClr val="accent1"/>
-            </a:fillRef>
-            <a:effectRef idx="0">
-              <a:schemeClr val="accent1"/>
-            </a:effectRef>
-            <a:fontRef idx="minor">
-              <a:schemeClr val="tx1"/>
-            </a:fontRef>
-          </p:style>
-        </p:cxnSp>
-        <p:cxnSp>
-          <p:nvCxnSpPr>
-            <p:cNvPr id="27" name="Straight Connector 26"/>
-            <p:cNvCxnSpPr/>
-            <p:nvPr/>
-          </p:nvCxnSpPr>
-          <p:spPr>
-            <a:xfrm>
-              <a:off x="3248051" y="852025"/>
-              <a:ext cx="237741" cy="0"/>
-            </a:xfrm>
-            <a:prstGeom prst="line">
-              <a:avLst/>
-            </a:prstGeom>
-            <a:ln w="12700">
-              <a:solidFill>
-                <a:srgbClr val="FF0000"/>
-              </a:solidFill>
-            </a:ln>
-          </p:spPr>
-          <p:style>
-            <a:lnRef idx="1">
-              <a:schemeClr val="accent1"/>
-            </a:lnRef>
-            <a:fillRef idx="0">
-              <a:schemeClr val="accent1"/>
-            </a:fillRef>
-            <a:effectRef idx="0">
-              <a:schemeClr val="accent1"/>
-            </a:effectRef>
-            <a:fontRef idx="minor">
-              <a:schemeClr val="tx1"/>
-            </a:fontRef>
-          </p:style>
-        </p:cxnSp>
-        <p:cxnSp>
-          <p:nvCxnSpPr>
-            <p:cNvPr id="28" name="Straight Connector 27"/>
-            <p:cNvCxnSpPr/>
-            <p:nvPr/>
-          </p:nvCxnSpPr>
-          <p:spPr>
-            <a:xfrm>
-              <a:off x="3332262" y="877874"/>
-              <a:ext cx="237741" cy="0"/>
-            </a:xfrm>
-            <a:prstGeom prst="line">
-              <a:avLst/>
-            </a:prstGeom>
-            <a:ln w="12700">
-              <a:solidFill>
-                <a:srgbClr val="FF0000"/>
-              </a:solidFill>
-            </a:ln>
-          </p:spPr>
-          <p:style>
-            <a:lnRef idx="1">
-              <a:schemeClr val="accent1"/>
-            </a:lnRef>
-            <a:fillRef idx="0">
-              <a:schemeClr val="accent1"/>
-            </a:fillRef>
-            <a:effectRef idx="0">
-              <a:schemeClr val="accent1"/>
-            </a:effectRef>
-            <a:fontRef idx="minor">
-              <a:schemeClr val="tx1"/>
-            </a:fontRef>
-          </p:style>
-        </p:cxnSp>
-        <p:cxnSp>
-          <p:nvCxnSpPr>
-            <p:cNvPr id="29" name="Straight Connector 28"/>
-            <p:cNvCxnSpPr/>
-            <p:nvPr/>
-          </p:nvCxnSpPr>
-          <p:spPr>
-            <a:xfrm>
-              <a:off x="3410189" y="800185"/>
-              <a:ext cx="237741" cy="0"/>
-            </a:xfrm>
-            <a:prstGeom prst="line">
-              <a:avLst/>
-            </a:prstGeom>
-            <a:ln w="12700">
-              <a:solidFill>
-                <a:srgbClr val="FF0000"/>
-              </a:solidFill>
-            </a:ln>
-          </p:spPr>
-          <p:style>
-            <a:lnRef idx="1">
-              <a:schemeClr val="accent1"/>
-            </a:lnRef>
-            <a:fillRef idx="0">
-              <a:schemeClr val="accent1"/>
-            </a:fillRef>
-            <a:effectRef idx="0">
-              <a:schemeClr val="accent1"/>
-            </a:effectRef>
-            <a:fontRef idx="minor">
-              <a:schemeClr val="tx1"/>
-            </a:fontRef>
-          </p:style>
-        </p:cxnSp>
-      </p:grpSp>
       <p:sp>
         <p:nvSpPr>
           <p:cNvPr id="4" name="Rectangle 3"/>
@@ -3763,7 +3648,7 @@
         </p:nvSpPr>
         <p:spPr>
           <a:xfrm>
-            <a:off x="3008946" y="2020930"/>
+            <a:off x="3027996" y="1995530"/>
             <a:ext cx="941093" cy="345995"/>
           </a:xfrm>
           <a:custGeom>
@@ -3858,7 +3743,7 @@
         <p:spPr>
           <a:xfrm>
             <a:off x="3702145" y="2272018"/>
-            <a:ext cx="513484" cy="158405"/>
+            <a:ext cx="600204" cy="158405"/>
           </a:xfrm>
           <a:prstGeom prst="rect">
             <a:avLst/>
@@ -3868,6 +3753,11 @@
               <a:lumMod val="90000"/>
             </a:schemeClr>
           </a:solidFill>
+          <a:ln>
+            <a:solidFill>
+              <a:schemeClr val="tx1"/>
+            </a:solidFill>
+          </a:ln>
         </p:spPr>
         <p:style>
           <a:lnRef idx="2">
@@ -4088,8 +3978,8 @@
         </p:nvSpPr>
         <p:spPr>
           <a:xfrm>
-            <a:off x="3914017" y="2293994"/>
-            <a:ext cx="107024" cy="107024"/>
+            <a:off x="3710585" y="2281247"/>
+            <a:ext cx="137160" cy="137160"/>
           </a:xfrm>
           <a:prstGeom prst="ellipse">
             <a:avLst/>
@@ -4097,6 +3987,11 @@
           <a:solidFill>
             <a:srgbClr val="FF0000"/>
           </a:solidFill>
+          <a:ln w="6350">
+            <a:solidFill>
+              <a:schemeClr val="tx1"/>
+            </a:solidFill>
+          </a:ln>
         </p:spPr>
         <p:style>
           <a:lnRef idx="2">
@@ -4131,8 +4026,8 @@
         </p:nvSpPr>
         <p:spPr>
           <a:xfrm>
-            <a:off x="4091014" y="2293994"/>
-            <a:ext cx="107024" cy="107024"/>
+            <a:off x="3861919" y="2281087"/>
+            <a:ext cx="137160" cy="137160"/>
           </a:xfrm>
           <a:prstGeom prst="ellipse">
             <a:avLst/>
@@ -4140,6 +4035,11 @@
           <a:solidFill>
             <a:srgbClr val="FFCC00"/>
           </a:solidFill>
+          <a:ln w="6350">
+            <a:solidFill>
+              <a:schemeClr val="tx1"/>
+            </a:solidFill>
+          </a:ln>
         </p:spPr>
         <p:style>
           <a:lnRef idx="2">
@@ -4174,7 +4074,7 @@
         </p:nvSpPr>
         <p:spPr>
           <a:xfrm>
-            <a:off x="4191175" y="2306920"/>
+            <a:off x="4219912" y="2355527"/>
             <a:ext cx="698592" cy="276999"/>
           </a:xfrm>
           <a:prstGeom prst="rect">
@@ -4212,795 +4112,6 @@
           </a:p>
         </p:txBody>
       </p:sp>
-      <p:grpSp>
-        <p:nvGrpSpPr>
-          <p:cNvPr id="87" name="Group 86"/>
-          <p:cNvGrpSpPr/>
-          <p:nvPr/>
-        </p:nvGrpSpPr>
-        <p:grpSpPr>
-          <a:xfrm>
-            <a:off x="3915502" y="1272781"/>
-            <a:ext cx="547064" cy="473109"/>
-            <a:chOff x="2600037" y="963536"/>
-            <a:chExt cx="547064" cy="473109"/>
-          </a:xfrm>
-        </p:grpSpPr>
-        <p:grpSp>
-          <p:nvGrpSpPr>
-            <p:cNvPr id="71" name="Group 70"/>
-            <p:cNvGrpSpPr/>
-            <p:nvPr/>
-          </p:nvGrpSpPr>
-          <p:grpSpPr>
-            <a:xfrm>
-              <a:off x="2600037" y="1039672"/>
-              <a:ext cx="313178" cy="313178"/>
-              <a:chOff x="3443941" y="1205259"/>
-              <a:chExt cx="313178" cy="313178"/>
-            </a:xfrm>
-          </p:grpSpPr>
-          <p:sp>
-            <p:nvSpPr>
-              <p:cNvPr id="65" name="Oval 64"/>
-              <p:cNvSpPr/>
-              <p:nvPr/>
-            </p:nvSpPr>
-            <p:spPr>
-              <a:xfrm>
-                <a:off x="3443941" y="1205259"/>
-                <a:ext cx="313178" cy="313178"/>
-              </a:xfrm>
-              <a:prstGeom prst="ellipse">
-                <a:avLst/>
-              </a:prstGeom>
-              <a:noFill/>
-              <a:ln w="19050"/>
-            </p:spPr>
-            <p:style>
-              <a:lnRef idx="2">
-                <a:schemeClr val="accent1">
-                  <a:shade val="50000"/>
-                </a:schemeClr>
-              </a:lnRef>
-              <a:fillRef idx="1">
-                <a:schemeClr val="accent1"/>
-              </a:fillRef>
-              <a:effectRef idx="0">
-                <a:schemeClr val="accent1"/>
-              </a:effectRef>
-              <a:fontRef idx="minor">
-                <a:schemeClr val="lt1"/>
-              </a:fontRef>
-            </p:style>
-            <p:txBody>
-              <a:bodyPr rtlCol="0" anchor="ctr"/>
-              <a:lstStyle/>
-              <a:p>
-                <a:pPr algn="ctr"/>
-                <a:endParaRPr lang="en-US"/>
-              </a:p>
-            </p:txBody>
-          </p:sp>
-          <p:sp>
-            <p:nvSpPr>
-              <p:cNvPr id="70" name="Freeform 69"/>
-              <p:cNvSpPr/>
-              <p:nvPr/>
-            </p:nvSpPr>
-            <p:spPr>
-              <a:xfrm>
-                <a:off x="3698966" y="1240910"/>
-                <a:ext cx="43542" cy="43543"/>
-              </a:xfrm>
-              <a:custGeom>
-                <a:avLst/>
-                <a:gdLst>
-                  <a:gd name="connsiteX0" fmla="*/ 0 w 43542"/>
-                  <a:gd name="connsiteY0" fmla="*/ 0 h 43543"/>
-                  <a:gd name="connsiteX1" fmla="*/ 43542 w 43542"/>
-                  <a:gd name="connsiteY1" fmla="*/ 43543 h 43543"/>
-                </a:gdLst>
-                <a:ahLst/>
-                <a:cxnLst>
-                  <a:cxn ang="0">
-                    <a:pos x="connsiteX0" y="connsiteY0"/>
-                  </a:cxn>
-                  <a:cxn ang="0">
-                    <a:pos x="connsiteX1" y="connsiteY1"/>
-                  </a:cxn>
-                </a:cxnLst>
-                <a:rect l="l" t="t" r="r" b="b"/>
-                <a:pathLst>
-                  <a:path w="43542" h="43543">
-                    <a:moveTo>
-                      <a:pt x="0" y="0"/>
-                    </a:moveTo>
-                    <a:lnTo>
-                      <a:pt x="43542" y="43543"/>
-                    </a:lnTo>
-                  </a:path>
-                </a:pathLst>
-              </a:custGeom>
-              <a:noFill/>
-              <a:ln w="28575">
-                <a:solidFill>
-                  <a:srgbClr val="FF0000"/>
-                </a:solidFill>
-              </a:ln>
-            </p:spPr>
-            <p:style>
-              <a:lnRef idx="2">
-                <a:schemeClr val="accent1">
-                  <a:shade val="50000"/>
-                </a:schemeClr>
-              </a:lnRef>
-              <a:fillRef idx="1">
-                <a:schemeClr val="accent1"/>
-              </a:fillRef>
-              <a:effectRef idx="0">
-                <a:schemeClr val="accent1"/>
-              </a:effectRef>
-              <a:fontRef idx="minor">
-                <a:schemeClr val="lt1"/>
-              </a:fontRef>
-            </p:style>
-            <p:txBody>
-              <a:bodyPr rtlCol="0" anchor="ctr"/>
-              <a:lstStyle/>
-              <a:p>
-                <a:pPr algn="ctr"/>
-                <a:endParaRPr lang="en-US"/>
-              </a:p>
-            </p:txBody>
-          </p:sp>
-        </p:grpSp>
-        <p:grpSp>
-          <p:nvGrpSpPr>
-            <p:cNvPr id="72" name="Group 71"/>
-            <p:cNvGrpSpPr/>
-            <p:nvPr/>
-          </p:nvGrpSpPr>
-          <p:grpSpPr>
-            <a:xfrm>
-              <a:off x="2641718" y="974831"/>
-              <a:ext cx="313178" cy="313178"/>
-              <a:chOff x="3443941" y="1205259"/>
-              <a:chExt cx="313178" cy="313178"/>
-            </a:xfrm>
-          </p:grpSpPr>
-          <p:sp>
-            <p:nvSpPr>
-              <p:cNvPr id="73" name="Oval 72"/>
-              <p:cNvSpPr/>
-              <p:nvPr/>
-            </p:nvSpPr>
-            <p:spPr>
-              <a:xfrm>
-                <a:off x="3443941" y="1205259"/>
-                <a:ext cx="313178" cy="313178"/>
-              </a:xfrm>
-              <a:prstGeom prst="ellipse">
-                <a:avLst/>
-              </a:prstGeom>
-              <a:noFill/>
-              <a:ln w="19050"/>
-            </p:spPr>
-            <p:style>
-              <a:lnRef idx="2">
-                <a:schemeClr val="accent1">
-                  <a:shade val="50000"/>
-                </a:schemeClr>
-              </a:lnRef>
-              <a:fillRef idx="1">
-                <a:schemeClr val="accent1"/>
-              </a:fillRef>
-              <a:effectRef idx="0">
-                <a:schemeClr val="accent1"/>
-              </a:effectRef>
-              <a:fontRef idx="minor">
-                <a:schemeClr val="lt1"/>
-              </a:fontRef>
-            </p:style>
-            <p:txBody>
-              <a:bodyPr rtlCol="0" anchor="ctr"/>
-              <a:lstStyle/>
-              <a:p>
-                <a:pPr algn="ctr"/>
-                <a:endParaRPr lang="en-US"/>
-              </a:p>
-            </p:txBody>
-          </p:sp>
-          <p:sp>
-            <p:nvSpPr>
-              <p:cNvPr id="74" name="Freeform 73"/>
-              <p:cNvSpPr/>
-              <p:nvPr/>
-            </p:nvSpPr>
-            <p:spPr>
-              <a:xfrm>
-                <a:off x="3698966" y="1240910"/>
-                <a:ext cx="43542" cy="43543"/>
-              </a:xfrm>
-              <a:custGeom>
-                <a:avLst/>
-                <a:gdLst>
-                  <a:gd name="connsiteX0" fmla="*/ 0 w 43542"/>
-                  <a:gd name="connsiteY0" fmla="*/ 0 h 43543"/>
-                  <a:gd name="connsiteX1" fmla="*/ 43542 w 43542"/>
-                  <a:gd name="connsiteY1" fmla="*/ 43543 h 43543"/>
-                </a:gdLst>
-                <a:ahLst/>
-                <a:cxnLst>
-                  <a:cxn ang="0">
-                    <a:pos x="connsiteX0" y="connsiteY0"/>
-                  </a:cxn>
-                  <a:cxn ang="0">
-                    <a:pos x="connsiteX1" y="connsiteY1"/>
-                  </a:cxn>
-                </a:cxnLst>
-                <a:rect l="l" t="t" r="r" b="b"/>
-                <a:pathLst>
-                  <a:path w="43542" h="43543">
-                    <a:moveTo>
-                      <a:pt x="0" y="0"/>
-                    </a:moveTo>
-                    <a:lnTo>
-                      <a:pt x="43542" y="43543"/>
-                    </a:lnTo>
-                  </a:path>
-                </a:pathLst>
-              </a:custGeom>
-              <a:noFill/>
-              <a:ln w="28575">
-                <a:solidFill>
-                  <a:srgbClr val="FF0000"/>
-                </a:solidFill>
-              </a:ln>
-            </p:spPr>
-            <p:style>
-              <a:lnRef idx="2">
-                <a:schemeClr val="accent1">
-                  <a:shade val="50000"/>
-                </a:schemeClr>
-              </a:lnRef>
-              <a:fillRef idx="1">
-                <a:schemeClr val="accent1"/>
-              </a:fillRef>
-              <a:effectRef idx="0">
-                <a:schemeClr val="accent1"/>
-              </a:effectRef>
-              <a:fontRef idx="minor">
-                <a:schemeClr val="lt1"/>
-              </a:fontRef>
-            </p:style>
-            <p:txBody>
-              <a:bodyPr rtlCol="0" anchor="ctr"/>
-              <a:lstStyle/>
-              <a:p>
-                <a:pPr algn="ctr"/>
-                <a:endParaRPr lang="en-US"/>
-              </a:p>
-            </p:txBody>
-          </p:sp>
-        </p:grpSp>
-        <p:grpSp>
-          <p:nvGrpSpPr>
-            <p:cNvPr id="75" name="Group 74"/>
-            <p:cNvGrpSpPr/>
-            <p:nvPr/>
-          </p:nvGrpSpPr>
-          <p:grpSpPr>
-            <a:xfrm>
-              <a:off x="2698473" y="1049149"/>
-              <a:ext cx="313178" cy="313178"/>
-              <a:chOff x="3443941" y="1205259"/>
-              <a:chExt cx="313178" cy="313178"/>
-            </a:xfrm>
-          </p:grpSpPr>
-          <p:sp>
-            <p:nvSpPr>
-              <p:cNvPr id="76" name="Oval 75"/>
-              <p:cNvSpPr/>
-              <p:nvPr/>
-            </p:nvSpPr>
-            <p:spPr>
-              <a:xfrm>
-                <a:off x="3443941" y="1205259"/>
-                <a:ext cx="313178" cy="313178"/>
-              </a:xfrm>
-              <a:prstGeom prst="ellipse">
-                <a:avLst/>
-              </a:prstGeom>
-              <a:noFill/>
-              <a:ln w="19050"/>
-            </p:spPr>
-            <p:style>
-              <a:lnRef idx="2">
-                <a:schemeClr val="accent1">
-                  <a:shade val="50000"/>
-                </a:schemeClr>
-              </a:lnRef>
-              <a:fillRef idx="1">
-                <a:schemeClr val="accent1"/>
-              </a:fillRef>
-              <a:effectRef idx="0">
-                <a:schemeClr val="accent1"/>
-              </a:effectRef>
-              <a:fontRef idx="minor">
-                <a:schemeClr val="lt1"/>
-              </a:fontRef>
-            </p:style>
-            <p:txBody>
-              <a:bodyPr rtlCol="0" anchor="ctr"/>
-              <a:lstStyle/>
-              <a:p>
-                <a:pPr algn="ctr"/>
-                <a:endParaRPr lang="en-US"/>
-              </a:p>
-            </p:txBody>
-          </p:sp>
-          <p:sp>
-            <p:nvSpPr>
-              <p:cNvPr id="77" name="Freeform 76"/>
-              <p:cNvSpPr/>
-              <p:nvPr/>
-            </p:nvSpPr>
-            <p:spPr>
-              <a:xfrm>
-                <a:off x="3698966" y="1240910"/>
-                <a:ext cx="43542" cy="43543"/>
-              </a:xfrm>
-              <a:custGeom>
-                <a:avLst/>
-                <a:gdLst>
-                  <a:gd name="connsiteX0" fmla="*/ 0 w 43542"/>
-                  <a:gd name="connsiteY0" fmla="*/ 0 h 43543"/>
-                  <a:gd name="connsiteX1" fmla="*/ 43542 w 43542"/>
-                  <a:gd name="connsiteY1" fmla="*/ 43543 h 43543"/>
-                </a:gdLst>
-                <a:ahLst/>
-                <a:cxnLst>
-                  <a:cxn ang="0">
-                    <a:pos x="connsiteX0" y="connsiteY0"/>
-                  </a:cxn>
-                  <a:cxn ang="0">
-                    <a:pos x="connsiteX1" y="connsiteY1"/>
-                  </a:cxn>
-                </a:cxnLst>
-                <a:rect l="l" t="t" r="r" b="b"/>
-                <a:pathLst>
-                  <a:path w="43542" h="43543">
-                    <a:moveTo>
-                      <a:pt x="0" y="0"/>
-                    </a:moveTo>
-                    <a:lnTo>
-                      <a:pt x="43542" y="43543"/>
-                    </a:lnTo>
-                  </a:path>
-                </a:pathLst>
-              </a:custGeom>
-              <a:noFill/>
-              <a:ln w="28575">
-                <a:solidFill>
-                  <a:srgbClr val="FF0000"/>
-                </a:solidFill>
-              </a:ln>
-            </p:spPr>
-            <p:style>
-              <a:lnRef idx="2">
-                <a:schemeClr val="accent1">
-                  <a:shade val="50000"/>
-                </a:schemeClr>
-              </a:lnRef>
-              <a:fillRef idx="1">
-                <a:schemeClr val="accent1"/>
-              </a:fillRef>
-              <a:effectRef idx="0">
-                <a:schemeClr val="accent1"/>
-              </a:effectRef>
-              <a:fontRef idx="minor">
-                <a:schemeClr val="lt1"/>
-              </a:fontRef>
-            </p:style>
-            <p:txBody>
-              <a:bodyPr rtlCol="0" anchor="ctr"/>
-              <a:lstStyle/>
-              <a:p>
-                <a:pPr algn="ctr"/>
-                <a:endParaRPr lang="en-US"/>
-              </a:p>
-            </p:txBody>
-          </p:sp>
-        </p:grpSp>
-        <p:grpSp>
-          <p:nvGrpSpPr>
-            <p:cNvPr id="78" name="Group 77"/>
-            <p:cNvGrpSpPr/>
-            <p:nvPr/>
-          </p:nvGrpSpPr>
-          <p:grpSpPr>
-            <a:xfrm>
-              <a:off x="2755228" y="1123467"/>
-              <a:ext cx="313178" cy="313178"/>
-              <a:chOff x="3443941" y="1205259"/>
-              <a:chExt cx="313178" cy="313178"/>
-            </a:xfrm>
-          </p:grpSpPr>
-          <p:sp>
-            <p:nvSpPr>
-              <p:cNvPr id="79" name="Oval 78"/>
-              <p:cNvSpPr/>
-              <p:nvPr/>
-            </p:nvSpPr>
-            <p:spPr>
-              <a:xfrm>
-                <a:off x="3443941" y="1205259"/>
-                <a:ext cx="313178" cy="313178"/>
-              </a:xfrm>
-              <a:prstGeom prst="ellipse">
-                <a:avLst/>
-              </a:prstGeom>
-              <a:noFill/>
-              <a:ln w="19050"/>
-            </p:spPr>
-            <p:style>
-              <a:lnRef idx="2">
-                <a:schemeClr val="accent1">
-                  <a:shade val="50000"/>
-                </a:schemeClr>
-              </a:lnRef>
-              <a:fillRef idx="1">
-                <a:schemeClr val="accent1"/>
-              </a:fillRef>
-              <a:effectRef idx="0">
-                <a:schemeClr val="accent1"/>
-              </a:effectRef>
-              <a:fontRef idx="minor">
-                <a:schemeClr val="lt1"/>
-              </a:fontRef>
-            </p:style>
-            <p:txBody>
-              <a:bodyPr rtlCol="0" anchor="ctr"/>
-              <a:lstStyle/>
-              <a:p>
-                <a:pPr algn="ctr"/>
-                <a:endParaRPr lang="en-US"/>
-              </a:p>
-            </p:txBody>
-          </p:sp>
-          <p:sp>
-            <p:nvSpPr>
-              <p:cNvPr id="80" name="Freeform 79"/>
-              <p:cNvSpPr/>
-              <p:nvPr/>
-            </p:nvSpPr>
-            <p:spPr>
-              <a:xfrm>
-                <a:off x="3698966" y="1240910"/>
-                <a:ext cx="43542" cy="43543"/>
-              </a:xfrm>
-              <a:custGeom>
-                <a:avLst/>
-                <a:gdLst>
-                  <a:gd name="connsiteX0" fmla="*/ 0 w 43542"/>
-                  <a:gd name="connsiteY0" fmla="*/ 0 h 43543"/>
-                  <a:gd name="connsiteX1" fmla="*/ 43542 w 43542"/>
-                  <a:gd name="connsiteY1" fmla="*/ 43543 h 43543"/>
-                </a:gdLst>
-                <a:ahLst/>
-                <a:cxnLst>
-                  <a:cxn ang="0">
-                    <a:pos x="connsiteX0" y="connsiteY0"/>
-                  </a:cxn>
-                  <a:cxn ang="0">
-                    <a:pos x="connsiteX1" y="connsiteY1"/>
-                  </a:cxn>
-                </a:cxnLst>
-                <a:rect l="l" t="t" r="r" b="b"/>
-                <a:pathLst>
-                  <a:path w="43542" h="43543">
-                    <a:moveTo>
-                      <a:pt x="0" y="0"/>
-                    </a:moveTo>
-                    <a:lnTo>
-                      <a:pt x="43542" y="43543"/>
-                    </a:lnTo>
-                  </a:path>
-                </a:pathLst>
-              </a:custGeom>
-              <a:noFill/>
-              <a:ln w="28575">
-                <a:solidFill>
-                  <a:srgbClr val="FF0000"/>
-                </a:solidFill>
-              </a:ln>
-            </p:spPr>
-            <p:style>
-              <a:lnRef idx="2">
-                <a:schemeClr val="accent1">
-                  <a:shade val="50000"/>
-                </a:schemeClr>
-              </a:lnRef>
-              <a:fillRef idx="1">
-                <a:schemeClr val="accent1"/>
-              </a:fillRef>
-              <a:effectRef idx="0">
-                <a:schemeClr val="accent1"/>
-              </a:effectRef>
-              <a:fontRef idx="minor">
-                <a:schemeClr val="lt1"/>
-              </a:fontRef>
-            </p:style>
-            <p:txBody>
-              <a:bodyPr rtlCol="0" anchor="ctr"/>
-              <a:lstStyle/>
-              <a:p>
-                <a:pPr algn="ctr"/>
-                <a:endParaRPr lang="en-US"/>
-              </a:p>
-            </p:txBody>
-          </p:sp>
-        </p:grpSp>
-        <p:grpSp>
-          <p:nvGrpSpPr>
-            <p:cNvPr id="81" name="Group 80"/>
-            <p:cNvGrpSpPr/>
-            <p:nvPr/>
-          </p:nvGrpSpPr>
-          <p:grpSpPr>
-            <a:xfrm>
-              <a:off x="2831301" y="1058626"/>
-              <a:ext cx="313178" cy="313178"/>
-              <a:chOff x="3443941" y="1205259"/>
-              <a:chExt cx="313178" cy="313178"/>
-            </a:xfrm>
-          </p:grpSpPr>
-          <p:sp>
-            <p:nvSpPr>
-              <p:cNvPr id="82" name="Oval 81"/>
-              <p:cNvSpPr/>
-              <p:nvPr/>
-            </p:nvSpPr>
-            <p:spPr>
-              <a:xfrm>
-                <a:off x="3443941" y="1205259"/>
-                <a:ext cx="313178" cy="313178"/>
-              </a:xfrm>
-              <a:prstGeom prst="ellipse">
-                <a:avLst/>
-              </a:prstGeom>
-              <a:noFill/>
-              <a:ln w="19050"/>
-            </p:spPr>
-            <p:style>
-              <a:lnRef idx="2">
-                <a:schemeClr val="accent1">
-                  <a:shade val="50000"/>
-                </a:schemeClr>
-              </a:lnRef>
-              <a:fillRef idx="1">
-                <a:schemeClr val="accent1"/>
-              </a:fillRef>
-              <a:effectRef idx="0">
-                <a:schemeClr val="accent1"/>
-              </a:effectRef>
-              <a:fontRef idx="minor">
-                <a:schemeClr val="lt1"/>
-              </a:fontRef>
-            </p:style>
-            <p:txBody>
-              <a:bodyPr rtlCol="0" anchor="ctr"/>
-              <a:lstStyle/>
-              <a:p>
-                <a:pPr algn="ctr"/>
-                <a:endParaRPr lang="en-US"/>
-              </a:p>
-            </p:txBody>
-          </p:sp>
-          <p:sp>
-            <p:nvSpPr>
-              <p:cNvPr id="83" name="Freeform 82"/>
-              <p:cNvSpPr/>
-              <p:nvPr/>
-            </p:nvSpPr>
-            <p:spPr>
-              <a:xfrm>
-                <a:off x="3698966" y="1240910"/>
-                <a:ext cx="43542" cy="43543"/>
-              </a:xfrm>
-              <a:custGeom>
-                <a:avLst/>
-                <a:gdLst>
-                  <a:gd name="connsiteX0" fmla="*/ 0 w 43542"/>
-                  <a:gd name="connsiteY0" fmla="*/ 0 h 43543"/>
-                  <a:gd name="connsiteX1" fmla="*/ 43542 w 43542"/>
-                  <a:gd name="connsiteY1" fmla="*/ 43543 h 43543"/>
-                </a:gdLst>
-                <a:ahLst/>
-                <a:cxnLst>
-                  <a:cxn ang="0">
-                    <a:pos x="connsiteX0" y="connsiteY0"/>
-                  </a:cxn>
-                  <a:cxn ang="0">
-                    <a:pos x="connsiteX1" y="connsiteY1"/>
-                  </a:cxn>
-                </a:cxnLst>
-                <a:rect l="l" t="t" r="r" b="b"/>
-                <a:pathLst>
-                  <a:path w="43542" h="43543">
-                    <a:moveTo>
-                      <a:pt x="0" y="0"/>
-                    </a:moveTo>
-                    <a:lnTo>
-                      <a:pt x="43542" y="43543"/>
-                    </a:lnTo>
-                  </a:path>
-                </a:pathLst>
-              </a:custGeom>
-              <a:noFill/>
-              <a:ln w="28575">
-                <a:solidFill>
-                  <a:srgbClr val="FF0000"/>
-                </a:solidFill>
-              </a:ln>
-            </p:spPr>
-            <p:style>
-              <a:lnRef idx="2">
-                <a:schemeClr val="accent1">
-                  <a:shade val="50000"/>
-                </a:schemeClr>
-              </a:lnRef>
-              <a:fillRef idx="1">
-                <a:schemeClr val="accent1"/>
-              </a:fillRef>
-              <a:effectRef idx="0">
-                <a:schemeClr val="accent1"/>
-              </a:effectRef>
-              <a:fontRef idx="minor">
-                <a:schemeClr val="lt1"/>
-              </a:fontRef>
-            </p:style>
-            <p:txBody>
-              <a:bodyPr rtlCol="0" anchor="ctr"/>
-              <a:lstStyle/>
-              <a:p>
-                <a:pPr algn="ctr"/>
-                <a:endParaRPr lang="en-US"/>
-              </a:p>
-            </p:txBody>
-          </p:sp>
-        </p:grpSp>
-        <p:grpSp>
-          <p:nvGrpSpPr>
-            <p:cNvPr id="84" name="Group 83"/>
-            <p:cNvGrpSpPr/>
-            <p:nvPr/>
-          </p:nvGrpSpPr>
-          <p:grpSpPr>
-            <a:xfrm>
-              <a:off x="2833923" y="963536"/>
-              <a:ext cx="313178" cy="313178"/>
-              <a:chOff x="3443941" y="1205259"/>
-              <a:chExt cx="313178" cy="313178"/>
-            </a:xfrm>
-          </p:grpSpPr>
-          <p:sp>
-            <p:nvSpPr>
-              <p:cNvPr id="85" name="Oval 84"/>
-              <p:cNvSpPr/>
-              <p:nvPr/>
-            </p:nvSpPr>
-            <p:spPr>
-              <a:xfrm>
-                <a:off x="3443941" y="1205259"/>
-                <a:ext cx="313178" cy="313178"/>
-              </a:xfrm>
-              <a:prstGeom prst="ellipse">
-                <a:avLst/>
-              </a:prstGeom>
-              <a:noFill/>
-              <a:ln w="19050"/>
-            </p:spPr>
-            <p:style>
-              <a:lnRef idx="2">
-                <a:schemeClr val="accent1">
-                  <a:shade val="50000"/>
-                </a:schemeClr>
-              </a:lnRef>
-              <a:fillRef idx="1">
-                <a:schemeClr val="accent1"/>
-              </a:fillRef>
-              <a:effectRef idx="0">
-                <a:schemeClr val="accent1"/>
-              </a:effectRef>
-              <a:fontRef idx="minor">
-                <a:schemeClr val="lt1"/>
-              </a:fontRef>
-            </p:style>
-            <p:txBody>
-              <a:bodyPr rtlCol="0" anchor="ctr"/>
-              <a:lstStyle/>
-              <a:p>
-                <a:pPr algn="ctr"/>
-                <a:endParaRPr lang="en-US"/>
-              </a:p>
-            </p:txBody>
-          </p:sp>
-          <p:sp>
-            <p:nvSpPr>
-              <p:cNvPr id="86" name="Freeform 85"/>
-              <p:cNvSpPr/>
-              <p:nvPr/>
-            </p:nvSpPr>
-            <p:spPr>
-              <a:xfrm>
-                <a:off x="3698966" y="1240910"/>
-                <a:ext cx="43542" cy="43543"/>
-              </a:xfrm>
-              <a:custGeom>
-                <a:avLst/>
-                <a:gdLst>
-                  <a:gd name="connsiteX0" fmla="*/ 0 w 43542"/>
-                  <a:gd name="connsiteY0" fmla="*/ 0 h 43543"/>
-                  <a:gd name="connsiteX1" fmla="*/ 43542 w 43542"/>
-                  <a:gd name="connsiteY1" fmla="*/ 43543 h 43543"/>
-                </a:gdLst>
-                <a:ahLst/>
-                <a:cxnLst>
-                  <a:cxn ang="0">
-                    <a:pos x="connsiteX0" y="connsiteY0"/>
-                  </a:cxn>
-                  <a:cxn ang="0">
-                    <a:pos x="connsiteX1" y="connsiteY1"/>
-                  </a:cxn>
-                </a:cxnLst>
-                <a:rect l="l" t="t" r="r" b="b"/>
-                <a:pathLst>
-                  <a:path w="43542" h="43543">
-                    <a:moveTo>
-                      <a:pt x="0" y="0"/>
-                    </a:moveTo>
-                    <a:lnTo>
-                      <a:pt x="43542" y="43543"/>
-                    </a:lnTo>
-                  </a:path>
-                </a:pathLst>
-              </a:custGeom>
-              <a:noFill/>
-              <a:ln w="28575">
-                <a:solidFill>
-                  <a:srgbClr val="FF0000"/>
-                </a:solidFill>
-              </a:ln>
-            </p:spPr>
-            <p:style>
-              <a:lnRef idx="2">
-                <a:schemeClr val="accent1">
-                  <a:shade val="50000"/>
-                </a:schemeClr>
-              </a:lnRef>
-              <a:fillRef idx="1">
-                <a:schemeClr val="accent1"/>
-              </a:fillRef>
-              <a:effectRef idx="0">
-                <a:schemeClr val="accent1"/>
-              </a:effectRef>
-              <a:fontRef idx="minor">
-                <a:schemeClr val="lt1"/>
-              </a:fontRef>
-            </p:style>
-            <p:txBody>
-              <a:bodyPr rtlCol="0" anchor="ctr"/>
-              <a:lstStyle/>
-              <a:p>
-                <a:pPr algn="ctr"/>
-                <a:endParaRPr lang="en-US"/>
-              </a:p>
-            </p:txBody>
-          </p:sp>
-        </p:grpSp>
-      </p:grpSp>
       <p:sp>
         <p:nvSpPr>
           <p:cNvPr id="111" name="Oval 110"/>
@@ -5048,7 +4159,7 @@
           <a:p>
             <a:pPr algn="ctr"/>
             <a:r>
-              <a:rPr lang="en-US" sz="1400" dirty="0" err="1" smtClean="0"/>
+              <a:rPr lang="en-US" sz="1400" dirty="0" smtClean="0"/>
               <a:t>Nuc</a:t>
             </a:r>
             <a:endParaRPr lang="en-US" sz="1400" dirty="0"/>
@@ -5102,59 +4213,13 @@
           <a:p>
             <a:pPr algn="ctr"/>
             <a:r>
-              <a:rPr lang="en-US" sz="1400" dirty="0" err="1" smtClean="0"/>
+              <a:rPr lang="en-US" sz="1400" dirty="0" smtClean="0"/>
               <a:t>Nuc</a:t>
             </a:r>
             <a:endParaRPr lang="en-US" sz="1400" dirty="0"/>
           </a:p>
         </p:txBody>
       </p:sp>
-      <p:pic>
-        <p:nvPicPr>
-          <p:cNvPr id="13" name="Picture 12"/>
-          <p:cNvPicPr>
-            <a:picLocks noChangeAspect="1"/>
-          </p:cNvPicPr>
-          <p:nvPr/>
-        </p:nvPicPr>
-        <p:blipFill rotWithShape="1">
-          <a:blip r:embed="rId2"/>
-          <a:srcRect b="22130"/>
-          <a:stretch/>
-        </p:blipFill>
-        <p:spPr>
-          <a:xfrm>
-            <a:off x="1490516" y="3151098"/>
-            <a:ext cx="1400528" cy="871481"/>
-          </a:xfrm>
-          <a:prstGeom prst="rect">
-            <a:avLst/>
-          </a:prstGeom>
-        </p:spPr>
-      </p:pic>
-      <p:pic>
-        <p:nvPicPr>
-          <p:cNvPr id="15" name="Picture 14"/>
-          <p:cNvPicPr>
-            <a:picLocks noChangeAspect="1"/>
-          </p:cNvPicPr>
-          <p:nvPr/>
-        </p:nvPicPr>
-        <p:blipFill rotWithShape="1">
-          <a:blip r:embed="rId3"/>
-          <a:srcRect l="25788" b="24090"/>
-          <a:stretch/>
-        </p:blipFill>
-        <p:spPr>
-          <a:xfrm>
-            <a:off x="3109387" y="3211607"/>
-            <a:ext cx="1034193" cy="819606"/>
-          </a:xfrm>
-          <a:prstGeom prst="rect">
-            <a:avLst/>
-          </a:prstGeom>
-        </p:spPr>
-      </p:pic>
       <p:cxnSp>
         <p:nvCxnSpPr>
           <p:cNvPr id="31" name="Straight Arrow Connector 30"/>
@@ -5229,7 +4294,7 @@
         </p:nvSpPr>
         <p:spPr>
           <a:xfrm>
-            <a:off x="3139675" y="3958144"/>
+            <a:off x="3138098" y="3957101"/>
             <a:ext cx="791302" cy="307777"/>
           </a:xfrm>
           <a:prstGeom prst="rect">
@@ -5259,8 +4324,8 @@
         </p:nvSpPr>
         <p:spPr>
           <a:xfrm>
-            <a:off x="4228809" y="2923876"/>
-            <a:ext cx="587044" cy="279885"/>
+            <a:off x="4118181" y="2887129"/>
+            <a:ext cx="841567" cy="302327"/>
           </a:xfrm>
           <a:prstGeom prst="rect">
             <a:avLst/>
@@ -5275,12 +4340,23 @@
           <a:p>
             <a:pPr algn="ctr">
               <a:lnSpc>
-                <a:spcPts val="700"/>
+                <a:spcPts val="800"/>
               </a:lnSpc>
             </a:pPr>
             <a:r>
               <a:rPr lang="en-US" sz="900" dirty="0" smtClean="0"/>
-              <a:t>Growth Slope</a:t>
+              <a:t>Log2 </a:t>
+            </a:r>
+            <a:br>
+              <a:rPr lang="en-US" sz="900" dirty="0" smtClean="0"/>
+            </a:br>
+            <a:r>
+              <a:rPr lang="en-US" sz="900" dirty="0" smtClean="0"/>
+              <a:t>Growth </a:t>
+            </a:r>
+            <a:r>
+              <a:rPr lang="en-US" sz="900" dirty="0" smtClean="0"/>
+              <a:t>Slope</a:t>
             </a:r>
             <a:endParaRPr lang="en-US" sz="900" dirty="0"/>
           </a:p>
@@ -5854,45 +4930,6 @@
       </p:sp>
       <p:sp>
         <p:nvSpPr>
-          <p:cNvPr id="33" name="TextBox 32"/>
-          <p:cNvSpPr txBox="1"/>
-          <p:nvPr/>
-        </p:nvSpPr>
-        <p:spPr>
-          <a:xfrm>
-            <a:off x="2000401" y="3152354"/>
-            <a:ext cx="1724345" cy="230832"/>
-          </a:xfrm>
-          <a:prstGeom prst="rect">
-            <a:avLst/>
-          </a:prstGeom>
-          <a:solidFill>
-            <a:schemeClr val="bg1"/>
-          </a:solidFill>
-          <a:ln>
-            <a:noFill/>
-          </a:ln>
-        </p:spPr>
-        <p:txBody>
-          <a:bodyPr wrap="square" rtlCol="0">
-            <a:spAutoFit/>
-          </a:bodyPr>
-          <a:lstStyle/>
-          <a:p>
-            <a:r>
-              <a:rPr lang="en-US" sz="900" dirty="0"/>
-              <a:t>t</a:t>
-            </a:r>
-            <a:r>
-              <a:rPr lang="en-US" sz="900" dirty="0" smtClean="0"/>
-              <a:t>pm	              tpm</a:t>
-            </a:r>
-            <a:endParaRPr lang="en-US" sz="900" dirty="0"/>
-          </a:p>
-        </p:txBody>
-      </p:sp>
-      <p:sp>
-        <p:nvSpPr>
           <p:cNvPr id="115" name="Rectangle 114"/>
           <p:cNvSpPr/>
           <p:nvPr/>
@@ -6282,6 +5319,1679 @@
               <a:t>-1.3</a:t>
             </a:r>
             <a:endParaRPr lang="en-US" sz="900" dirty="0"/>
+          </a:p>
+        </p:txBody>
+      </p:sp>
+      <p:sp>
+        <p:nvSpPr>
+          <p:cNvPr id="88" name="Rectangle 87"/>
+          <p:cNvSpPr/>
+          <p:nvPr/>
+        </p:nvSpPr>
+        <p:spPr>
+          <a:xfrm>
+            <a:off x="3099269" y="1111170"/>
+            <a:ext cx="274320" cy="18288"/>
+          </a:xfrm>
+          <a:prstGeom prst="rect">
+            <a:avLst/>
+          </a:prstGeom>
+          <a:solidFill>
+            <a:schemeClr val="accent1"/>
+          </a:solidFill>
+          <a:ln>
+            <a:noFill/>
+          </a:ln>
+        </p:spPr>
+        <p:style>
+          <a:lnRef idx="2">
+            <a:schemeClr val="accent1">
+              <a:shade val="50000"/>
+            </a:schemeClr>
+          </a:lnRef>
+          <a:fillRef idx="1">
+            <a:schemeClr val="accent1"/>
+          </a:fillRef>
+          <a:effectRef idx="0">
+            <a:schemeClr val="accent1"/>
+          </a:effectRef>
+          <a:fontRef idx="minor">
+            <a:schemeClr val="lt1"/>
+          </a:fontRef>
+        </p:style>
+        <p:txBody>
+          <a:bodyPr rtlCol="0" anchor="ctr"/>
+          <a:lstStyle/>
+          <a:p>
+            <a:pPr algn="ctr"/>
+            <a:endParaRPr lang="en-US"/>
+          </a:p>
+        </p:txBody>
+      </p:sp>
+      <p:sp>
+        <p:nvSpPr>
+          <p:cNvPr id="89" name="Rectangle 88"/>
+          <p:cNvSpPr/>
+          <p:nvPr/>
+        </p:nvSpPr>
+        <p:spPr>
+          <a:xfrm>
+            <a:off x="3169566" y="1145278"/>
+            <a:ext cx="274320" cy="18288"/>
+          </a:xfrm>
+          <a:prstGeom prst="rect">
+            <a:avLst/>
+          </a:prstGeom>
+          <a:solidFill>
+            <a:schemeClr val="accent2"/>
+          </a:solidFill>
+          <a:ln>
+            <a:noFill/>
+          </a:ln>
+        </p:spPr>
+        <p:style>
+          <a:lnRef idx="2">
+            <a:schemeClr val="accent1">
+              <a:shade val="50000"/>
+            </a:schemeClr>
+          </a:lnRef>
+          <a:fillRef idx="1">
+            <a:schemeClr val="accent1"/>
+          </a:fillRef>
+          <a:effectRef idx="0">
+            <a:schemeClr val="accent1"/>
+          </a:effectRef>
+          <a:fontRef idx="minor">
+            <a:schemeClr val="lt1"/>
+          </a:fontRef>
+        </p:style>
+        <p:txBody>
+          <a:bodyPr rtlCol="0" anchor="ctr"/>
+          <a:lstStyle/>
+          <a:p>
+            <a:pPr algn="ctr"/>
+            <a:endParaRPr lang="en-US"/>
+          </a:p>
+        </p:txBody>
+      </p:sp>
+      <p:sp>
+        <p:nvSpPr>
+          <p:cNvPr id="90" name="Rectangle 89"/>
+          <p:cNvSpPr/>
+          <p:nvPr/>
+        </p:nvSpPr>
+        <p:spPr>
+          <a:xfrm>
+            <a:off x="3228455" y="1178645"/>
+            <a:ext cx="274320" cy="18288"/>
+          </a:xfrm>
+          <a:prstGeom prst="rect">
+            <a:avLst/>
+          </a:prstGeom>
+          <a:solidFill>
+            <a:schemeClr val="accent3"/>
+          </a:solidFill>
+          <a:ln>
+            <a:noFill/>
+          </a:ln>
+        </p:spPr>
+        <p:style>
+          <a:lnRef idx="2">
+            <a:schemeClr val="accent1">
+              <a:shade val="50000"/>
+            </a:schemeClr>
+          </a:lnRef>
+          <a:fillRef idx="1">
+            <a:schemeClr val="accent1"/>
+          </a:fillRef>
+          <a:effectRef idx="0">
+            <a:schemeClr val="accent1"/>
+          </a:effectRef>
+          <a:fontRef idx="minor">
+            <a:schemeClr val="lt1"/>
+          </a:fontRef>
+        </p:style>
+        <p:txBody>
+          <a:bodyPr rtlCol="0" anchor="ctr"/>
+          <a:lstStyle/>
+          <a:p>
+            <a:pPr algn="ctr"/>
+            <a:endParaRPr lang="en-US"/>
+          </a:p>
+        </p:txBody>
+      </p:sp>
+      <p:sp>
+        <p:nvSpPr>
+          <p:cNvPr id="91" name="Rectangle 90"/>
+          <p:cNvSpPr/>
+          <p:nvPr/>
+        </p:nvSpPr>
+        <p:spPr>
+          <a:xfrm>
+            <a:off x="3032406" y="1224591"/>
+            <a:ext cx="274320" cy="18288"/>
+          </a:xfrm>
+          <a:prstGeom prst="rect">
+            <a:avLst/>
+          </a:prstGeom>
+          <a:solidFill>
+            <a:schemeClr val="accent4"/>
+          </a:solidFill>
+          <a:ln>
+            <a:noFill/>
+          </a:ln>
+        </p:spPr>
+        <p:style>
+          <a:lnRef idx="2">
+            <a:schemeClr val="accent1">
+              <a:shade val="50000"/>
+            </a:schemeClr>
+          </a:lnRef>
+          <a:fillRef idx="1">
+            <a:schemeClr val="accent1"/>
+          </a:fillRef>
+          <a:effectRef idx="0">
+            <a:schemeClr val="accent1"/>
+          </a:effectRef>
+          <a:fontRef idx="minor">
+            <a:schemeClr val="lt1"/>
+          </a:fontRef>
+        </p:style>
+        <p:txBody>
+          <a:bodyPr rtlCol="0" anchor="ctr"/>
+          <a:lstStyle/>
+          <a:p>
+            <a:pPr algn="ctr"/>
+            <a:endParaRPr lang="en-US"/>
+          </a:p>
+        </p:txBody>
+      </p:sp>
+      <p:sp>
+        <p:nvSpPr>
+          <p:cNvPr id="92" name="Rectangle 91"/>
+          <p:cNvSpPr/>
+          <p:nvPr/>
+        </p:nvSpPr>
+        <p:spPr>
+          <a:xfrm>
+            <a:off x="3356157" y="1209247"/>
+            <a:ext cx="274320" cy="18288"/>
+          </a:xfrm>
+          <a:prstGeom prst="rect">
+            <a:avLst/>
+          </a:prstGeom>
+          <a:solidFill>
+            <a:schemeClr val="accent5"/>
+          </a:solidFill>
+          <a:ln>
+            <a:noFill/>
+          </a:ln>
+        </p:spPr>
+        <p:style>
+          <a:lnRef idx="2">
+            <a:schemeClr val="accent1">
+              <a:shade val="50000"/>
+            </a:schemeClr>
+          </a:lnRef>
+          <a:fillRef idx="1">
+            <a:schemeClr val="accent1"/>
+          </a:fillRef>
+          <a:effectRef idx="0">
+            <a:schemeClr val="accent1"/>
+          </a:effectRef>
+          <a:fontRef idx="minor">
+            <a:schemeClr val="lt1"/>
+          </a:fontRef>
+        </p:style>
+        <p:txBody>
+          <a:bodyPr rtlCol="0" anchor="ctr"/>
+          <a:lstStyle/>
+          <a:p>
+            <a:pPr algn="ctr"/>
+            <a:endParaRPr lang="en-US"/>
+          </a:p>
+        </p:txBody>
+      </p:sp>
+      <p:sp>
+        <p:nvSpPr>
+          <p:cNvPr id="93" name="Rectangle 92"/>
+          <p:cNvSpPr/>
+          <p:nvPr/>
+        </p:nvSpPr>
+        <p:spPr>
+          <a:xfrm>
+            <a:off x="3418702" y="1249042"/>
+            <a:ext cx="274320" cy="18288"/>
+          </a:xfrm>
+          <a:prstGeom prst="rect">
+            <a:avLst/>
+          </a:prstGeom>
+          <a:solidFill>
+            <a:schemeClr val="accent5">
+              <a:lumMod val="75000"/>
+            </a:schemeClr>
+          </a:solidFill>
+          <a:ln>
+            <a:noFill/>
+          </a:ln>
+        </p:spPr>
+        <p:style>
+          <a:lnRef idx="2">
+            <a:schemeClr val="accent1">
+              <a:shade val="50000"/>
+            </a:schemeClr>
+          </a:lnRef>
+          <a:fillRef idx="1">
+            <a:schemeClr val="accent1"/>
+          </a:fillRef>
+          <a:effectRef idx="0">
+            <a:schemeClr val="accent1"/>
+          </a:effectRef>
+          <a:fontRef idx="minor">
+            <a:schemeClr val="lt1"/>
+          </a:fontRef>
+        </p:style>
+        <p:txBody>
+          <a:bodyPr rtlCol="0" anchor="ctr"/>
+          <a:lstStyle/>
+          <a:p>
+            <a:pPr algn="ctr"/>
+            <a:endParaRPr lang="en-US"/>
+          </a:p>
+        </p:txBody>
+      </p:sp>
+      <p:sp>
+        <p:nvSpPr>
+          <p:cNvPr id="104" name="Rectangle 103"/>
+          <p:cNvSpPr/>
+          <p:nvPr/>
+        </p:nvSpPr>
+        <p:spPr>
+          <a:xfrm>
+            <a:off x="3123657" y="1257096"/>
+            <a:ext cx="274320" cy="18288"/>
+          </a:xfrm>
+          <a:prstGeom prst="rect">
+            <a:avLst/>
+          </a:prstGeom>
+          <a:solidFill>
+            <a:schemeClr val="accent6"/>
+          </a:solidFill>
+          <a:ln>
+            <a:noFill/>
+          </a:ln>
+        </p:spPr>
+        <p:style>
+          <a:lnRef idx="2">
+            <a:schemeClr val="accent1">
+              <a:shade val="50000"/>
+            </a:schemeClr>
+          </a:lnRef>
+          <a:fillRef idx="1">
+            <a:schemeClr val="accent1"/>
+          </a:fillRef>
+          <a:effectRef idx="0">
+            <a:schemeClr val="accent1"/>
+          </a:effectRef>
+          <a:fontRef idx="minor">
+            <a:schemeClr val="lt1"/>
+          </a:fontRef>
+        </p:style>
+        <p:txBody>
+          <a:bodyPr rtlCol="0" anchor="ctr"/>
+          <a:lstStyle/>
+          <a:p>
+            <a:pPr algn="ctr"/>
+            <a:endParaRPr lang="en-US"/>
+          </a:p>
+        </p:txBody>
+      </p:sp>
+      <p:sp>
+        <p:nvSpPr>
+          <p:cNvPr id="105" name="Rectangle 104"/>
+          <p:cNvSpPr/>
+          <p:nvPr/>
+        </p:nvSpPr>
+        <p:spPr>
+          <a:xfrm>
+            <a:off x="3466636" y="1149063"/>
+            <a:ext cx="274320" cy="18288"/>
+          </a:xfrm>
+          <a:prstGeom prst="rect">
+            <a:avLst/>
+          </a:prstGeom>
+          <a:solidFill>
+            <a:schemeClr val="accent2">
+              <a:lumMod val="75000"/>
+            </a:schemeClr>
+          </a:solidFill>
+          <a:ln>
+            <a:noFill/>
+          </a:ln>
+        </p:spPr>
+        <p:style>
+          <a:lnRef idx="2">
+            <a:schemeClr val="accent1">
+              <a:shade val="50000"/>
+            </a:schemeClr>
+          </a:lnRef>
+          <a:fillRef idx="1">
+            <a:schemeClr val="accent1"/>
+          </a:fillRef>
+          <a:effectRef idx="0">
+            <a:schemeClr val="accent1"/>
+          </a:effectRef>
+          <a:fontRef idx="minor">
+            <a:schemeClr val="lt1"/>
+          </a:fontRef>
+        </p:style>
+        <p:txBody>
+          <a:bodyPr rtlCol="0" anchor="ctr"/>
+          <a:lstStyle/>
+          <a:p>
+            <a:pPr algn="ctr"/>
+            <a:endParaRPr lang="en-US"/>
+          </a:p>
+        </p:txBody>
+      </p:sp>
+      <p:sp>
+        <p:nvSpPr>
+          <p:cNvPr id="107" name="Rectangle 106"/>
+          <p:cNvSpPr/>
+          <p:nvPr/>
+        </p:nvSpPr>
+        <p:spPr>
+          <a:xfrm>
+            <a:off x="3418702" y="1286382"/>
+            <a:ext cx="274320" cy="18288"/>
+          </a:xfrm>
+          <a:prstGeom prst="rect">
+            <a:avLst/>
+          </a:prstGeom>
+          <a:solidFill>
+            <a:schemeClr val="tx1">
+              <a:lumMod val="65000"/>
+              <a:lumOff val="35000"/>
+            </a:schemeClr>
+          </a:solidFill>
+          <a:ln>
+            <a:noFill/>
+          </a:ln>
+        </p:spPr>
+        <p:style>
+          <a:lnRef idx="2">
+            <a:schemeClr val="accent1">
+              <a:shade val="50000"/>
+            </a:schemeClr>
+          </a:lnRef>
+          <a:fillRef idx="1">
+            <a:schemeClr val="accent1"/>
+          </a:fillRef>
+          <a:effectRef idx="0">
+            <a:schemeClr val="accent1"/>
+          </a:effectRef>
+          <a:fontRef idx="minor">
+            <a:schemeClr val="lt1"/>
+          </a:fontRef>
+        </p:style>
+        <p:txBody>
+          <a:bodyPr rtlCol="0" anchor="ctr"/>
+          <a:lstStyle/>
+          <a:p>
+            <a:pPr algn="ctr"/>
+            <a:endParaRPr lang="en-US"/>
+          </a:p>
+        </p:txBody>
+      </p:sp>
+      <p:sp>
+        <p:nvSpPr>
+          <p:cNvPr id="108" name="Rectangle 107"/>
+          <p:cNvSpPr/>
+          <p:nvPr/>
+        </p:nvSpPr>
+        <p:spPr>
+          <a:xfrm>
+            <a:off x="3110932" y="1295806"/>
+            <a:ext cx="274320" cy="18288"/>
+          </a:xfrm>
+          <a:prstGeom prst="rect">
+            <a:avLst/>
+          </a:prstGeom>
+          <a:solidFill>
+            <a:schemeClr val="accent4">
+              <a:lumMod val="50000"/>
+            </a:schemeClr>
+          </a:solidFill>
+          <a:ln>
+            <a:noFill/>
+          </a:ln>
+        </p:spPr>
+        <p:style>
+          <a:lnRef idx="2">
+            <a:schemeClr val="accent1">
+              <a:shade val="50000"/>
+            </a:schemeClr>
+          </a:lnRef>
+          <a:fillRef idx="1">
+            <a:schemeClr val="accent1"/>
+          </a:fillRef>
+          <a:effectRef idx="0">
+            <a:schemeClr val="accent1"/>
+          </a:effectRef>
+          <a:fontRef idx="minor">
+            <a:schemeClr val="lt1"/>
+          </a:fontRef>
+        </p:style>
+        <p:txBody>
+          <a:bodyPr rtlCol="0" anchor="ctr"/>
+          <a:lstStyle/>
+          <a:p>
+            <a:pPr algn="ctr"/>
+            <a:endParaRPr lang="en-US"/>
+          </a:p>
+        </p:txBody>
+      </p:sp>
+      <p:sp>
+        <p:nvSpPr>
+          <p:cNvPr id="2" name="Oval 1"/>
+          <p:cNvSpPr/>
+          <p:nvPr/>
+        </p:nvSpPr>
+        <p:spPr>
+          <a:xfrm>
+            <a:off x="3750877" y="1396205"/>
+            <a:ext cx="182880" cy="182880"/>
+          </a:xfrm>
+          <a:prstGeom prst="ellipse">
+            <a:avLst/>
+          </a:prstGeom>
+          <a:noFill/>
+          <a:ln w="12700">
+            <a:solidFill>
+              <a:schemeClr val="tx1"/>
+            </a:solidFill>
+            <a:prstDash val="solid"/>
+          </a:ln>
+        </p:spPr>
+        <p:style>
+          <a:lnRef idx="2">
+            <a:schemeClr val="accent1">
+              <a:shade val="50000"/>
+            </a:schemeClr>
+          </a:lnRef>
+          <a:fillRef idx="1">
+            <a:schemeClr val="accent1"/>
+          </a:fillRef>
+          <a:effectRef idx="0">
+            <a:schemeClr val="accent1"/>
+          </a:effectRef>
+          <a:fontRef idx="minor">
+            <a:schemeClr val="lt1"/>
+          </a:fontRef>
+        </p:style>
+        <p:txBody>
+          <a:bodyPr rtlCol="0" anchor="ctr"/>
+          <a:lstStyle/>
+          <a:p>
+            <a:pPr algn="ctr"/>
+            <a:endParaRPr lang="en-US"/>
+          </a:p>
+        </p:txBody>
+      </p:sp>
+      <p:sp>
+        <p:nvSpPr>
+          <p:cNvPr id="122" name="Rectangle 121"/>
+          <p:cNvSpPr/>
+          <p:nvPr/>
+        </p:nvSpPr>
+        <p:spPr>
+          <a:xfrm rot="1620000">
+            <a:off x="3839217" y="1400806"/>
+            <a:ext cx="100584" cy="27432"/>
+          </a:xfrm>
+          <a:prstGeom prst="rect">
+            <a:avLst/>
+          </a:prstGeom>
+          <a:solidFill>
+            <a:schemeClr val="accent1"/>
+          </a:solidFill>
+          <a:ln>
+            <a:noFill/>
+          </a:ln>
+        </p:spPr>
+        <p:style>
+          <a:lnRef idx="2">
+            <a:schemeClr val="accent1">
+              <a:shade val="50000"/>
+            </a:schemeClr>
+          </a:lnRef>
+          <a:fillRef idx="1">
+            <a:schemeClr val="accent1"/>
+          </a:fillRef>
+          <a:effectRef idx="0">
+            <a:schemeClr val="accent1"/>
+          </a:effectRef>
+          <a:fontRef idx="minor">
+            <a:schemeClr val="lt1"/>
+          </a:fontRef>
+        </p:style>
+        <p:txBody>
+          <a:bodyPr rtlCol="0" anchor="ctr"/>
+          <a:lstStyle/>
+          <a:p>
+            <a:pPr algn="ctr"/>
+            <a:endParaRPr lang="en-US"/>
+          </a:p>
+        </p:txBody>
+      </p:sp>
+      <p:sp>
+        <p:nvSpPr>
+          <p:cNvPr id="143" name="Oval 142"/>
+          <p:cNvSpPr/>
+          <p:nvPr/>
+        </p:nvSpPr>
+        <p:spPr>
+          <a:xfrm>
+            <a:off x="3922390" y="1553273"/>
+            <a:ext cx="182880" cy="182880"/>
+          </a:xfrm>
+          <a:prstGeom prst="ellipse">
+            <a:avLst/>
+          </a:prstGeom>
+          <a:noFill/>
+          <a:ln w="12700">
+            <a:solidFill>
+              <a:schemeClr val="tx1"/>
+            </a:solidFill>
+            <a:prstDash val="solid"/>
+          </a:ln>
+        </p:spPr>
+        <p:style>
+          <a:lnRef idx="2">
+            <a:schemeClr val="accent1">
+              <a:shade val="50000"/>
+            </a:schemeClr>
+          </a:lnRef>
+          <a:fillRef idx="1">
+            <a:schemeClr val="accent1"/>
+          </a:fillRef>
+          <a:effectRef idx="0">
+            <a:schemeClr val="accent1"/>
+          </a:effectRef>
+          <a:fontRef idx="minor">
+            <a:schemeClr val="lt1"/>
+          </a:fontRef>
+        </p:style>
+        <p:txBody>
+          <a:bodyPr rtlCol="0" anchor="ctr"/>
+          <a:lstStyle/>
+          <a:p>
+            <a:pPr algn="ctr"/>
+            <a:endParaRPr lang="en-US"/>
+          </a:p>
+        </p:txBody>
+      </p:sp>
+      <p:sp>
+        <p:nvSpPr>
+          <p:cNvPr id="145" name="Oval 144"/>
+          <p:cNvSpPr/>
+          <p:nvPr/>
+        </p:nvSpPr>
+        <p:spPr>
+          <a:xfrm>
+            <a:off x="4045929" y="1510486"/>
+            <a:ext cx="182880" cy="182880"/>
+          </a:xfrm>
+          <a:prstGeom prst="ellipse">
+            <a:avLst/>
+          </a:prstGeom>
+          <a:noFill/>
+          <a:ln w="12700">
+            <a:solidFill>
+              <a:schemeClr val="tx1"/>
+            </a:solidFill>
+            <a:prstDash val="solid"/>
+          </a:ln>
+        </p:spPr>
+        <p:style>
+          <a:lnRef idx="2">
+            <a:schemeClr val="accent1">
+              <a:shade val="50000"/>
+            </a:schemeClr>
+          </a:lnRef>
+          <a:fillRef idx="1">
+            <a:schemeClr val="accent1"/>
+          </a:fillRef>
+          <a:effectRef idx="0">
+            <a:schemeClr val="accent1"/>
+          </a:effectRef>
+          <a:fontRef idx="minor">
+            <a:schemeClr val="lt1"/>
+          </a:fontRef>
+        </p:style>
+        <p:txBody>
+          <a:bodyPr rtlCol="0" anchor="ctr"/>
+          <a:lstStyle/>
+          <a:p>
+            <a:pPr algn="ctr"/>
+            <a:endParaRPr lang="en-US"/>
+          </a:p>
+        </p:txBody>
+      </p:sp>
+      <p:sp>
+        <p:nvSpPr>
+          <p:cNvPr id="128" name="Rectangle 127"/>
+          <p:cNvSpPr/>
+          <p:nvPr/>
+        </p:nvSpPr>
+        <p:spPr>
+          <a:xfrm rot="1620000">
+            <a:off x="4133822" y="1519682"/>
+            <a:ext cx="100584" cy="27432"/>
+          </a:xfrm>
+          <a:prstGeom prst="rect">
+            <a:avLst/>
+          </a:prstGeom>
+          <a:solidFill>
+            <a:schemeClr val="accent6"/>
+          </a:solidFill>
+          <a:ln>
+            <a:noFill/>
+          </a:ln>
+        </p:spPr>
+        <p:style>
+          <a:lnRef idx="2">
+            <a:schemeClr val="accent1">
+              <a:shade val="50000"/>
+            </a:schemeClr>
+          </a:lnRef>
+          <a:fillRef idx="1">
+            <a:schemeClr val="accent1"/>
+          </a:fillRef>
+          <a:effectRef idx="0">
+            <a:schemeClr val="accent1"/>
+          </a:effectRef>
+          <a:fontRef idx="minor">
+            <a:schemeClr val="lt1"/>
+          </a:fontRef>
+        </p:style>
+        <p:txBody>
+          <a:bodyPr rtlCol="0" anchor="ctr"/>
+          <a:lstStyle/>
+          <a:p>
+            <a:pPr algn="ctr"/>
+            <a:endParaRPr lang="en-US"/>
+          </a:p>
+        </p:txBody>
+      </p:sp>
+      <p:sp>
+        <p:nvSpPr>
+          <p:cNvPr id="147" name="Oval 146"/>
+          <p:cNvSpPr/>
+          <p:nvPr/>
+        </p:nvSpPr>
+        <p:spPr>
+          <a:xfrm>
+            <a:off x="3964349" y="1329232"/>
+            <a:ext cx="182880" cy="182880"/>
+          </a:xfrm>
+          <a:prstGeom prst="ellipse">
+            <a:avLst/>
+          </a:prstGeom>
+          <a:noFill/>
+          <a:ln w="9525">
+            <a:solidFill>
+              <a:schemeClr val="tx1"/>
+            </a:solidFill>
+            <a:prstDash val="solid"/>
+          </a:ln>
+        </p:spPr>
+        <p:style>
+          <a:lnRef idx="2">
+            <a:schemeClr val="accent1">
+              <a:shade val="50000"/>
+            </a:schemeClr>
+          </a:lnRef>
+          <a:fillRef idx="1">
+            <a:schemeClr val="accent1"/>
+          </a:fillRef>
+          <a:effectRef idx="0">
+            <a:schemeClr val="accent1"/>
+          </a:effectRef>
+          <a:fontRef idx="minor">
+            <a:schemeClr val="lt1"/>
+          </a:fontRef>
+        </p:style>
+        <p:txBody>
+          <a:bodyPr rtlCol="0" anchor="ctr"/>
+          <a:lstStyle/>
+          <a:p>
+            <a:pPr algn="ctr"/>
+            <a:endParaRPr lang="en-US"/>
+          </a:p>
+        </p:txBody>
+      </p:sp>
+      <p:sp>
+        <p:nvSpPr>
+          <p:cNvPr id="129" name="Rectangle 128"/>
+          <p:cNvSpPr/>
+          <p:nvPr/>
+        </p:nvSpPr>
+        <p:spPr>
+          <a:xfrm rot="1620000">
+            <a:off x="4061276" y="1334622"/>
+            <a:ext cx="100584" cy="27432"/>
+          </a:xfrm>
+          <a:prstGeom prst="rect">
+            <a:avLst/>
+          </a:prstGeom>
+          <a:solidFill>
+            <a:schemeClr val="accent2">
+              <a:lumMod val="75000"/>
+            </a:schemeClr>
+          </a:solidFill>
+          <a:ln>
+            <a:noFill/>
+          </a:ln>
+        </p:spPr>
+        <p:style>
+          <a:lnRef idx="2">
+            <a:schemeClr val="accent1">
+              <a:shade val="50000"/>
+            </a:schemeClr>
+          </a:lnRef>
+          <a:fillRef idx="1">
+            <a:schemeClr val="accent1"/>
+          </a:fillRef>
+          <a:effectRef idx="0">
+            <a:schemeClr val="accent1"/>
+          </a:effectRef>
+          <a:fontRef idx="minor">
+            <a:schemeClr val="lt1"/>
+          </a:fontRef>
+        </p:style>
+        <p:txBody>
+          <a:bodyPr rtlCol="0" anchor="ctr"/>
+          <a:lstStyle/>
+          <a:p>
+            <a:pPr algn="ctr"/>
+            <a:endParaRPr lang="en-US"/>
+          </a:p>
+        </p:txBody>
+      </p:sp>
+      <p:sp>
+        <p:nvSpPr>
+          <p:cNvPr id="148" name="Oval 147"/>
+          <p:cNvSpPr/>
+          <p:nvPr/>
+        </p:nvSpPr>
+        <p:spPr>
+          <a:xfrm>
+            <a:off x="4012077" y="1421293"/>
+            <a:ext cx="182880" cy="182880"/>
+          </a:xfrm>
+          <a:prstGeom prst="ellipse">
+            <a:avLst/>
+          </a:prstGeom>
+          <a:noFill/>
+          <a:ln w="12700">
+            <a:solidFill>
+              <a:schemeClr val="tx1"/>
+            </a:solidFill>
+            <a:prstDash val="solid"/>
+          </a:ln>
+        </p:spPr>
+        <p:style>
+          <a:lnRef idx="2">
+            <a:schemeClr val="accent1">
+              <a:shade val="50000"/>
+            </a:schemeClr>
+          </a:lnRef>
+          <a:fillRef idx="1">
+            <a:schemeClr val="accent1"/>
+          </a:fillRef>
+          <a:effectRef idx="0">
+            <a:schemeClr val="accent1"/>
+          </a:effectRef>
+          <a:fontRef idx="minor">
+            <a:schemeClr val="lt1"/>
+          </a:fontRef>
+        </p:style>
+        <p:txBody>
+          <a:bodyPr rtlCol="0" anchor="ctr"/>
+          <a:lstStyle/>
+          <a:p>
+            <a:pPr algn="ctr"/>
+            <a:endParaRPr lang="en-US"/>
+          </a:p>
+        </p:txBody>
+      </p:sp>
+      <p:sp>
+        <p:nvSpPr>
+          <p:cNvPr id="130" name="Rectangle 129"/>
+          <p:cNvSpPr/>
+          <p:nvPr/>
+        </p:nvSpPr>
+        <p:spPr>
+          <a:xfrm rot="1620000">
+            <a:off x="4106877" y="1427926"/>
+            <a:ext cx="100584" cy="27432"/>
+          </a:xfrm>
+          <a:prstGeom prst="rect">
+            <a:avLst/>
+          </a:prstGeom>
+          <a:solidFill>
+            <a:schemeClr val="tx1">
+              <a:lumMod val="65000"/>
+              <a:lumOff val="35000"/>
+            </a:schemeClr>
+          </a:solidFill>
+          <a:ln>
+            <a:noFill/>
+          </a:ln>
+        </p:spPr>
+        <p:style>
+          <a:lnRef idx="2">
+            <a:schemeClr val="accent1">
+              <a:shade val="50000"/>
+            </a:schemeClr>
+          </a:lnRef>
+          <a:fillRef idx="1">
+            <a:schemeClr val="accent1"/>
+          </a:fillRef>
+          <a:effectRef idx="0">
+            <a:schemeClr val="accent1"/>
+          </a:effectRef>
+          <a:fontRef idx="minor">
+            <a:schemeClr val="lt1"/>
+          </a:fontRef>
+        </p:style>
+        <p:txBody>
+          <a:bodyPr rtlCol="0" anchor="ctr"/>
+          <a:lstStyle/>
+          <a:p>
+            <a:pPr algn="ctr"/>
+            <a:endParaRPr lang="en-US"/>
+          </a:p>
+        </p:txBody>
+      </p:sp>
+      <p:sp>
+        <p:nvSpPr>
+          <p:cNvPr id="149" name="Oval 148"/>
+          <p:cNvSpPr/>
+          <p:nvPr/>
+        </p:nvSpPr>
+        <p:spPr>
+          <a:xfrm>
+            <a:off x="4216889" y="1310155"/>
+            <a:ext cx="182880" cy="182880"/>
+          </a:xfrm>
+          <a:prstGeom prst="ellipse">
+            <a:avLst/>
+          </a:prstGeom>
+          <a:noFill/>
+          <a:ln w="12700">
+            <a:solidFill>
+              <a:schemeClr val="tx1"/>
+            </a:solidFill>
+            <a:prstDash val="solid"/>
+          </a:ln>
+        </p:spPr>
+        <p:style>
+          <a:lnRef idx="2">
+            <a:schemeClr val="accent1">
+              <a:shade val="50000"/>
+            </a:schemeClr>
+          </a:lnRef>
+          <a:fillRef idx="1">
+            <a:schemeClr val="accent1"/>
+          </a:fillRef>
+          <a:effectRef idx="0">
+            <a:schemeClr val="accent1"/>
+          </a:effectRef>
+          <a:fontRef idx="minor">
+            <a:schemeClr val="lt1"/>
+          </a:fontRef>
+        </p:style>
+        <p:txBody>
+          <a:bodyPr rtlCol="0" anchor="ctr"/>
+          <a:lstStyle/>
+          <a:p>
+            <a:pPr algn="ctr"/>
+            <a:endParaRPr lang="en-US"/>
+          </a:p>
+        </p:txBody>
+      </p:sp>
+      <p:sp>
+        <p:nvSpPr>
+          <p:cNvPr id="127" name="Rectangle 126"/>
+          <p:cNvSpPr/>
+          <p:nvPr/>
+        </p:nvSpPr>
+        <p:spPr>
+          <a:xfrm rot="1620000">
+            <a:off x="4303095" y="1314448"/>
+            <a:ext cx="100584" cy="27432"/>
+          </a:xfrm>
+          <a:prstGeom prst="rect">
+            <a:avLst/>
+          </a:prstGeom>
+          <a:solidFill>
+            <a:schemeClr val="accent5">
+              <a:lumMod val="75000"/>
+            </a:schemeClr>
+          </a:solidFill>
+          <a:ln>
+            <a:noFill/>
+          </a:ln>
+        </p:spPr>
+        <p:style>
+          <a:lnRef idx="2">
+            <a:schemeClr val="accent1">
+              <a:shade val="50000"/>
+            </a:schemeClr>
+          </a:lnRef>
+          <a:fillRef idx="1">
+            <a:schemeClr val="accent1"/>
+          </a:fillRef>
+          <a:effectRef idx="0">
+            <a:schemeClr val="accent1"/>
+          </a:effectRef>
+          <a:fontRef idx="minor">
+            <a:schemeClr val="lt1"/>
+          </a:fontRef>
+        </p:style>
+        <p:txBody>
+          <a:bodyPr rtlCol="0" anchor="ctr"/>
+          <a:lstStyle/>
+          <a:p>
+            <a:pPr algn="ctr"/>
+            <a:endParaRPr lang="en-US"/>
+          </a:p>
+        </p:txBody>
+      </p:sp>
+      <p:sp>
+        <p:nvSpPr>
+          <p:cNvPr id="150" name="Oval 149"/>
+          <p:cNvSpPr/>
+          <p:nvPr/>
+        </p:nvSpPr>
+        <p:spPr>
+          <a:xfrm>
+            <a:off x="3612048" y="1443424"/>
+            <a:ext cx="182880" cy="182880"/>
+          </a:xfrm>
+          <a:prstGeom prst="ellipse">
+            <a:avLst/>
+          </a:prstGeom>
+          <a:noFill/>
+          <a:ln w="12700">
+            <a:solidFill>
+              <a:schemeClr val="tx1"/>
+            </a:solidFill>
+            <a:prstDash val="solid"/>
+          </a:ln>
+        </p:spPr>
+        <p:style>
+          <a:lnRef idx="2">
+            <a:schemeClr val="accent1">
+              <a:shade val="50000"/>
+            </a:schemeClr>
+          </a:lnRef>
+          <a:fillRef idx="1">
+            <a:schemeClr val="accent1"/>
+          </a:fillRef>
+          <a:effectRef idx="0">
+            <a:schemeClr val="accent1"/>
+          </a:effectRef>
+          <a:fontRef idx="minor">
+            <a:schemeClr val="lt1"/>
+          </a:fontRef>
+        </p:style>
+        <p:txBody>
+          <a:bodyPr rtlCol="0" anchor="ctr"/>
+          <a:lstStyle/>
+          <a:p>
+            <a:pPr algn="ctr"/>
+            <a:endParaRPr lang="en-US"/>
+          </a:p>
+        </p:txBody>
+      </p:sp>
+      <p:sp>
+        <p:nvSpPr>
+          <p:cNvPr id="126" name="Rectangle 125"/>
+          <p:cNvSpPr/>
+          <p:nvPr/>
+        </p:nvSpPr>
+        <p:spPr>
+          <a:xfrm rot="1620000">
+            <a:off x="3703055" y="1450062"/>
+            <a:ext cx="100584" cy="27432"/>
+          </a:xfrm>
+          <a:prstGeom prst="rect">
+            <a:avLst/>
+          </a:prstGeom>
+          <a:solidFill>
+            <a:schemeClr val="accent5"/>
+          </a:solidFill>
+          <a:ln>
+            <a:noFill/>
+          </a:ln>
+        </p:spPr>
+        <p:style>
+          <a:lnRef idx="2">
+            <a:schemeClr val="accent1">
+              <a:shade val="50000"/>
+            </a:schemeClr>
+          </a:lnRef>
+          <a:fillRef idx="1">
+            <a:schemeClr val="accent1"/>
+          </a:fillRef>
+          <a:effectRef idx="0">
+            <a:schemeClr val="accent1"/>
+          </a:effectRef>
+          <a:fontRef idx="minor">
+            <a:schemeClr val="lt1"/>
+          </a:fontRef>
+        </p:style>
+        <p:txBody>
+          <a:bodyPr rtlCol="0" anchor="ctr"/>
+          <a:lstStyle/>
+          <a:p>
+            <a:pPr algn="ctr"/>
+            <a:endParaRPr lang="en-US"/>
+          </a:p>
+        </p:txBody>
+      </p:sp>
+      <p:sp>
+        <p:nvSpPr>
+          <p:cNvPr id="151" name="Oval 150"/>
+          <p:cNvSpPr/>
+          <p:nvPr/>
+        </p:nvSpPr>
+        <p:spPr>
+          <a:xfrm>
+            <a:off x="3868269" y="1269540"/>
+            <a:ext cx="182880" cy="182880"/>
+          </a:xfrm>
+          <a:prstGeom prst="ellipse">
+            <a:avLst/>
+          </a:prstGeom>
+          <a:noFill/>
+          <a:ln w="12700">
+            <a:solidFill>
+              <a:schemeClr val="tx1"/>
+            </a:solidFill>
+            <a:prstDash val="solid"/>
+          </a:ln>
+        </p:spPr>
+        <p:style>
+          <a:lnRef idx="2">
+            <a:schemeClr val="accent1">
+              <a:shade val="50000"/>
+            </a:schemeClr>
+          </a:lnRef>
+          <a:fillRef idx="1">
+            <a:schemeClr val="accent1"/>
+          </a:fillRef>
+          <a:effectRef idx="0">
+            <a:schemeClr val="accent1"/>
+          </a:effectRef>
+          <a:fontRef idx="minor">
+            <a:schemeClr val="lt1"/>
+          </a:fontRef>
+        </p:style>
+        <p:txBody>
+          <a:bodyPr rtlCol="0" anchor="ctr"/>
+          <a:lstStyle/>
+          <a:p>
+            <a:pPr algn="ctr"/>
+            <a:endParaRPr lang="en-US"/>
+          </a:p>
+        </p:txBody>
+      </p:sp>
+      <p:sp>
+        <p:nvSpPr>
+          <p:cNvPr id="124" name="Rectangle 123"/>
+          <p:cNvSpPr/>
+          <p:nvPr/>
+        </p:nvSpPr>
+        <p:spPr>
+          <a:xfrm rot="1620000">
+            <a:off x="3960788" y="1278874"/>
+            <a:ext cx="100584" cy="27432"/>
+          </a:xfrm>
+          <a:prstGeom prst="rect">
+            <a:avLst/>
+          </a:prstGeom>
+          <a:solidFill>
+            <a:schemeClr val="accent3"/>
+          </a:solidFill>
+          <a:ln>
+            <a:noFill/>
+          </a:ln>
+        </p:spPr>
+        <p:style>
+          <a:lnRef idx="2">
+            <a:schemeClr val="accent1">
+              <a:shade val="50000"/>
+            </a:schemeClr>
+          </a:lnRef>
+          <a:fillRef idx="1">
+            <a:schemeClr val="accent1"/>
+          </a:fillRef>
+          <a:effectRef idx="0">
+            <a:schemeClr val="accent1"/>
+          </a:effectRef>
+          <a:fontRef idx="minor">
+            <a:schemeClr val="lt1"/>
+          </a:fontRef>
+        </p:style>
+        <p:txBody>
+          <a:bodyPr rtlCol="0" anchor="ctr"/>
+          <a:lstStyle/>
+          <a:p>
+            <a:pPr algn="ctr"/>
+            <a:endParaRPr lang="en-US"/>
+          </a:p>
+        </p:txBody>
+      </p:sp>
+      <p:sp>
+        <p:nvSpPr>
+          <p:cNvPr id="153" name="Oval 152"/>
+          <p:cNvSpPr/>
+          <p:nvPr/>
+        </p:nvSpPr>
+        <p:spPr>
+          <a:xfrm>
+            <a:off x="3708787" y="1539083"/>
+            <a:ext cx="182880" cy="182880"/>
+          </a:xfrm>
+          <a:prstGeom prst="ellipse">
+            <a:avLst/>
+          </a:prstGeom>
+          <a:noFill/>
+          <a:ln w="12700">
+            <a:solidFill>
+              <a:schemeClr val="tx1"/>
+            </a:solidFill>
+            <a:prstDash val="solid"/>
+          </a:ln>
+        </p:spPr>
+        <p:style>
+          <a:lnRef idx="2">
+            <a:schemeClr val="accent1">
+              <a:shade val="50000"/>
+            </a:schemeClr>
+          </a:lnRef>
+          <a:fillRef idx="1">
+            <a:schemeClr val="accent1"/>
+          </a:fillRef>
+          <a:effectRef idx="0">
+            <a:schemeClr val="accent1"/>
+          </a:effectRef>
+          <a:fontRef idx="minor">
+            <a:schemeClr val="lt1"/>
+          </a:fontRef>
+        </p:style>
+        <p:txBody>
+          <a:bodyPr rtlCol="0" anchor="ctr"/>
+          <a:lstStyle/>
+          <a:p>
+            <a:pPr algn="ctr"/>
+            <a:endParaRPr lang="en-US"/>
+          </a:p>
+        </p:txBody>
+      </p:sp>
+      <p:sp>
+        <p:nvSpPr>
+          <p:cNvPr id="123" name="Rectangle 122"/>
+          <p:cNvSpPr/>
+          <p:nvPr/>
+        </p:nvSpPr>
+        <p:spPr>
+          <a:xfrm rot="1620000">
+            <a:off x="3801661" y="1542977"/>
+            <a:ext cx="100584" cy="27432"/>
+          </a:xfrm>
+          <a:prstGeom prst="rect">
+            <a:avLst/>
+          </a:prstGeom>
+          <a:solidFill>
+            <a:schemeClr val="accent2"/>
+          </a:solidFill>
+          <a:ln>
+            <a:noFill/>
+          </a:ln>
+        </p:spPr>
+        <p:style>
+          <a:lnRef idx="2">
+            <a:schemeClr val="accent1">
+              <a:shade val="50000"/>
+            </a:schemeClr>
+          </a:lnRef>
+          <a:fillRef idx="1">
+            <a:schemeClr val="accent1"/>
+          </a:fillRef>
+          <a:effectRef idx="0">
+            <a:schemeClr val="accent1"/>
+          </a:effectRef>
+          <a:fontRef idx="minor">
+            <a:schemeClr val="lt1"/>
+          </a:fontRef>
+        </p:style>
+        <p:txBody>
+          <a:bodyPr rtlCol="0" anchor="ctr"/>
+          <a:lstStyle/>
+          <a:p>
+            <a:pPr algn="ctr"/>
+            <a:endParaRPr lang="en-US"/>
+          </a:p>
+        </p:txBody>
+      </p:sp>
+      <p:sp>
+        <p:nvSpPr>
+          <p:cNvPr id="125" name="Rectangle 124"/>
+          <p:cNvSpPr/>
+          <p:nvPr/>
+        </p:nvSpPr>
+        <p:spPr>
+          <a:xfrm rot="1620000">
+            <a:off x="4003874" y="1555520"/>
+            <a:ext cx="100584" cy="27432"/>
+          </a:xfrm>
+          <a:prstGeom prst="rect">
+            <a:avLst/>
+          </a:prstGeom>
+          <a:solidFill>
+            <a:schemeClr val="accent4"/>
+          </a:solidFill>
+          <a:ln>
+            <a:noFill/>
+          </a:ln>
+        </p:spPr>
+        <p:style>
+          <a:lnRef idx="2">
+            <a:schemeClr val="accent1">
+              <a:shade val="50000"/>
+            </a:schemeClr>
+          </a:lnRef>
+          <a:fillRef idx="1">
+            <a:schemeClr val="accent1"/>
+          </a:fillRef>
+          <a:effectRef idx="0">
+            <a:schemeClr val="accent1"/>
+          </a:effectRef>
+          <a:fontRef idx="minor">
+            <a:schemeClr val="lt1"/>
+          </a:fontRef>
+        </p:style>
+        <p:txBody>
+          <a:bodyPr rtlCol="0" anchor="ctr"/>
+          <a:lstStyle/>
+          <a:p>
+            <a:pPr algn="ctr"/>
+            <a:endParaRPr lang="en-US"/>
+          </a:p>
+        </p:txBody>
+      </p:sp>
+      <p:sp>
+        <p:nvSpPr>
+          <p:cNvPr id="156" name="TextBox 155"/>
+          <p:cNvSpPr txBox="1"/>
+          <p:nvPr/>
+        </p:nvSpPr>
+        <p:spPr>
+          <a:xfrm>
+            <a:off x="3653135" y="2231431"/>
+            <a:ext cx="255198" cy="230832"/>
+          </a:xfrm>
+          <a:prstGeom prst="rect">
+            <a:avLst/>
+          </a:prstGeom>
+          <a:noFill/>
+        </p:spPr>
+        <p:txBody>
+          <a:bodyPr wrap="none" rtlCol="0">
+            <a:spAutoFit/>
+          </a:bodyPr>
+          <a:lstStyle/>
+          <a:p>
+            <a:r>
+              <a:rPr lang="en-US" sz="900" dirty="0" smtClean="0"/>
+              <a:t>D</a:t>
+            </a:r>
+            <a:endParaRPr lang="en-US" sz="900" dirty="0"/>
+          </a:p>
+        </p:txBody>
+      </p:sp>
+      <p:sp>
+        <p:nvSpPr>
+          <p:cNvPr id="157" name="TextBox 156"/>
+          <p:cNvSpPr txBox="1"/>
+          <p:nvPr/>
+        </p:nvSpPr>
+        <p:spPr>
+          <a:xfrm>
+            <a:off x="3789847" y="2231431"/>
+            <a:ext cx="287258" cy="230832"/>
+          </a:xfrm>
+          <a:prstGeom prst="rect">
+            <a:avLst/>
+          </a:prstGeom>
+          <a:noFill/>
+        </p:spPr>
+        <p:txBody>
+          <a:bodyPr wrap="none" rtlCol="0">
+            <a:spAutoFit/>
+          </a:bodyPr>
+          <a:lstStyle/>
+          <a:p>
+            <a:r>
+              <a:rPr lang="en-US" sz="900" dirty="0"/>
+              <a:t>W</a:t>
+            </a:r>
+            <a:endParaRPr lang="en-US" sz="900" dirty="0"/>
+          </a:p>
+        </p:txBody>
+      </p:sp>
+      <p:sp>
+        <p:nvSpPr>
+          <p:cNvPr id="158" name="Oval 157"/>
+          <p:cNvSpPr/>
+          <p:nvPr/>
+        </p:nvSpPr>
+        <p:spPr>
+          <a:xfrm>
+            <a:off x="4012410" y="2281087"/>
+            <a:ext cx="137160" cy="137160"/>
+          </a:xfrm>
+          <a:prstGeom prst="ellipse">
+            <a:avLst/>
+          </a:prstGeom>
+          <a:solidFill>
+            <a:srgbClr val="FFCC00"/>
+          </a:solidFill>
+          <a:ln w="6350">
+            <a:solidFill>
+              <a:schemeClr val="tx1"/>
+            </a:solidFill>
+          </a:ln>
+        </p:spPr>
+        <p:style>
+          <a:lnRef idx="2">
+            <a:schemeClr val="accent1">
+              <a:shade val="50000"/>
+            </a:schemeClr>
+          </a:lnRef>
+          <a:fillRef idx="1">
+            <a:schemeClr val="accent1"/>
+          </a:fillRef>
+          <a:effectRef idx="0">
+            <a:schemeClr val="accent1"/>
+          </a:effectRef>
+          <a:fontRef idx="minor">
+            <a:schemeClr val="lt1"/>
+          </a:fontRef>
+        </p:style>
+        <p:txBody>
+          <a:bodyPr rtlCol="0" anchor="ctr"/>
+          <a:lstStyle/>
+          <a:p>
+            <a:pPr algn="ctr"/>
+            <a:endParaRPr lang="en-US" sz="1000"/>
+          </a:p>
+        </p:txBody>
+      </p:sp>
+      <p:sp>
+        <p:nvSpPr>
+          <p:cNvPr id="159" name="Oval 158"/>
+          <p:cNvSpPr/>
+          <p:nvPr/>
+        </p:nvSpPr>
+        <p:spPr>
+          <a:xfrm>
+            <a:off x="4157589" y="2282398"/>
+            <a:ext cx="137160" cy="137160"/>
+          </a:xfrm>
+          <a:prstGeom prst="ellipse">
+            <a:avLst/>
+          </a:prstGeom>
+          <a:solidFill>
+            <a:srgbClr val="FF0000"/>
+          </a:solidFill>
+          <a:ln w="6350">
+            <a:solidFill>
+              <a:schemeClr val="tx1"/>
+            </a:solidFill>
+          </a:ln>
+        </p:spPr>
+        <p:style>
+          <a:lnRef idx="2">
+            <a:schemeClr val="accent1">
+              <a:shade val="50000"/>
+            </a:schemeClr>
+          </a:lnRef>
+          <a:fillRef idx="1">
+            <a:schemeClr val="accent1"/>
+          </a:fillRef>
+          <a:effectRef idx="0">
+            <a:schemeClr val="accent1"/>
+          </a:effectRef>
+          <a:fontRef idx="minor">
+            <a:schemeClr val="lt1"/>
+          </a:fontRef>
+        </p:style>
+        <p:txBody>
+          <a:bodyPr rtlCol="0" anchor="ctr"/>
+          <a:lstStyle/>
+          <a:p>
+            <a:pPr algn="ctr"/>
+            <a:endParaRPr lang="en-US" sz="1000"/>
+          </a:p>
+        </p:txBody>
+      </p:sp>
+      <p:sp>
+        <p:nvSpPr>
+          <p:cNvPr id="160" name="TextBox 159"/>
+          <p:cNvSpPr txBox="1"/>
+          <p:nvPr/>
+        </p:nvSpPr>
+        <p:spPr>
+          <a:xfrm>
+            <a:off x="4103985" y="2231431"/>
+            <a:ext cx="255198" cy="230832"/>
+          </a:xfrm>
+          <a:prstGeom prst="rect">
+            <a:avLst/>
+          </a:prstGeom>
+          <a:noFill/>
+        </p:spPr>
+        <p:txBody>
+          <a:bodyPr wrap="none" rtlCol="0">
+            <a:spAutoFit/>
+          </a:bodyPr>
+          <a:lstStyle/>
+          <a:p>
+            <a:r>
+              <a:rPr lang="en-US" sz="900" dirty="0" smtClean="0"/>
+              <a:t>D</a:t>
+            </a:r>
+            <a:endParaRPr lang="en-US" sz="900" dirty="0"/>
+          </a:p>
+        </p:txBody>
+      </p:sp>
+      <p:sp>
+        <p:nvSpPr>
+          <p:cNvPr id="161" name="TextBox 160"/>
+          <p:cNvSpPr txBox="1"/>
+          <p:nvPr/>
+        </p:nvSpPr>
+        <p:spPr>
+          <a:xfrm>
+            <a:off x="3935897" y="2231431"/>
+            <a:ext cx="287258" cy="230832"/>
+          </a:xfrm>
+          <a:prstGeom prst="rect">
+            <a:avLst/>
+          </a:prstGeom>
+          <a:noFill/>
+        </p:spPr>
+        <p:txBody>
+          <a:bodyPr wrap="none" rtlCol="0">
+            <a:spAutoFit/>
+          </a:bodyPr>
+          <a:lstStyle/>
+          <a:p>
+            <a:r>
+              <a:rPr lang="en-US" sz="900" dirty="0"/>
+              <a:t>W</a:t>
+            </a:r>
+            <a:endParaRPr lang="en-US" sz="900" dirty="0"/>
+          </a:p>
+        </p:txBody>
+      </p:sp>
+      <p:sp>
+        <p:nvSpPr>
+          <p:cNvPr id="38" name="Down Arrow 37"/>
+          <p:cNvSpPr/>
+          <p:nvPr/>
+        </p:nvSpPr>
+        <p:spPr>
+          <a:xfrm>
+            <a:off x="2063460" y="1288414"/>
+            <a:ext cx="128016" cy="164592"/>
+          </a:xfrm>
+          <a:prstGeom prst="downArrow">
+            <a:avLst/>
+          </a:prstGeom>
+          <a:solidFill>
+            <a:srgbClr val="00B050"/>
+          </a:solidFill>
+          <a:ln w="6350">
+            <a:solidFill>
+              <a:schemeClr val="tx1"/>
+            </a:solidFill>
+          </a:ln>
+        </p:spPr>
+        <p:style>
+          <a:lnRef idx="2">
+            <a:schemeClr val="accent1">
+              <a:shade val="50000"/>
+            </a:schemeClr>
+          </a:lnRef>
+          <a:fillRef idx="1">
+            <a:schemeClr val="accent1"/>
+          </a:fillRef>
+          <a:effectRef idx="0">
+            <a:schemeClr val="accent1"/>
+          </a:effectRef>
+          <a:fontRef idx="minor">
+            <a:schemeClr val="lt1"/>
+          </a:fontRef>
+        </p:style>
+        <p:txBody>
+          <a:bodyPr rtlCol="0" anchor="ctr"/>
+          <a:lstStyle/>
+          <a:p>
+            <a:pPr algn="ctr"/>
+            <a:endParaRPr lang="en-US"/>
+          </a:p>
+        </p:txBody>
+      </p:sp>
+      <p:sp>
+        <p:nvSpPr>
+          <p:cNvPr id="162" name="Down Arrow 161"/>
+          <p:cNvSpPr/>
+          <p:nvPr/>
+        </p:nvSpPr>
+        <p:spPr>
+          <a:xfrm>
+            <a:off x="2322956" y="1608248"/>
+            <a:ext cx="128016" cy="164592"/>
+          </a:xfrm>
+          <a:prstGeom prst="downArrow">
+            <a:avLst/>
+          </a:prstGeom>
+          <a:solidFill>
+            <a:srgbClr val="00B050"/>
+          </a:solidFill>
+          <a:ln w="6350">
+            <a:solidFill>
+              <a:schemeClr val="tx1"/>
+            </a:solidFill>
+          </a:ln>
+        </p:spPr>
+        <p:style>
+          <a:lnRef idx="2">
+            <a:schemeClr val="accent1">
+              <a:shade val="50000"/>
+            </a:schemeClr>
+          </a:lnRef>
+          <a:fillRef idx="1">
+            <a:schemeClr val="accent1"/>
+          </a:fillRef>
+          <a:effectRef idx="0">
+            <a:schemeClr val="accent1"/>
+          </a:effectRef>
+          <a:fontRef idx="minor">
+            <a:schemeClr val="lt1"/>
+          </a:fontRef>
+        </p:style>
+        <p:txBody>
+          <a:bodyPr rtlCol="0" anchor="ctr"/>
+          <a:lstStyle/>
+          <a:p>
+            <a:pPr algn="ctr"/>
+            <a:endParaRPr lang="en-US"/>
+          </a:p>
+        </p:txBody>
+      </p:sp>
+      <p:sp>
+        <p:nvSpPr>
+          <p:cNvPr id="163" name="Down Arrow 162"/>
+          <p:cNvSpPr/>
+          <p:nvPr/>
+        </p:nvSpPr>
+        <p:spPr>
+          <a:xfrm>
+            <a:off x="2939968" y="2863552"/>
+            <a:ext cx="128016" cy="164592"/>
+          </a:xfrm>
+          <a:prstGeom prst="downArrow">
+            <a:avLst/>
+          </a:prstGeom>
+          <a:solidFill>
+            <a:srgbClr val="00B050"/>
+          </a:solidFill>
+          <a:ln w="6350">
+            <a:solidFill>
+              <a:schemeClr val="tx1"/>
+            </a:solidFill>
+          </a:ln>
+        </p:spPr>
+        <p:style>
+          <a:lnRef idx="2">
+            <a:schemeClr val="accent1">
+              <a:shade val="50000"/>
+            </a:schemeClr>
+          </a:lnRef>
+          <a:fillRef idx="1">
+            <a:schemeClr val="accent1"/>
+          </a:fillRef>
+          <a:effectRef idx="0">
+            <a:schemeClr val="accent1"/>
+          </a:effectRef>
+          <a:fontRef idx="minor">
+            <a:schemeClr val="lt1"/>
+          </a:fontRef>
+        </p:style>
+        <p:txBody>
+          <a:bodyPr rtlCol="0" anchor="ctr"/>
+          <a:lstStyle/>
+          <a:p>
+            <a:pPr algn="ctr"/>
+            <a:endParaRPr lang="en-US"/>
           </a:p>
         </p:txBody>
       </p:sp>
@@ -6627,21 +7337,6 @@
 </file>
 
 <file path=customXml/item1.xml><?xml version="1.0" encoding="utf-8"?>
-<p:properties xmlns:p="http://schemas.microsoft.com/office/2006/metadata/properties" xmlns:xsi="http://www.w3.org/2001/XMLSchema-instance" xmlns:pc="http://schemas.microsoft.com/office/infopath/2007/PartnerControls">
-  <documentManagement/>
-</p:properties>
-</file>
-
-<file path=customXml/item2.xml><?xml version="1.0" encoding="utf-8"?>
-<?mso-contentType ?>
-<FormTemplates xmlns="http://schemas.microsoft.com/sharepoint/v3/contenttype/forms">
-  <Display>DocumentLibraryForm</Display>
-  <Edit>DocumentLibraryForm</Edit>
-  <New>DocumentLibraryForm</New>
-</FormTemplates>
-</file>
-
-<file path=customXml/item3.xml><?xml version="1.0" encoding="utf-8"?>
 <ct:contentTypeSchema xmlns:ct="http://schemas.microsoft.com/office/2006/metadata/contentType" xmlns:ma="http://schemas.microsoft.com/office/2006/metadata/properties/metaAttributes" ct:_="" ma:_="" ma:contentTypeName="Document" ma:contentTypeID="0x0101003B386B74BDD8AE4F897146AB15D0504F" ma:contentTypeVersion="11" ma:contentTypeDescription="Create a new document." ma:contentTypeScope="" ma:versionID="f314fc19cc81757bd9a72bbba36950ef">
   <xsd:schema xmlns:xsd="http://www.w3.org/2001/XMLSchema" xmlns:xs="http://www.w3.org/2001/XMLSchema" xmlns:p="http://schemas.microsoft.com/office/2006/metadata/properties" xmlns:ns3="9d71dc66-2ce2-4fa7-946a-79ef4f85df34" targetNamespace="http://schemas.microsoft.com/office/2006/metadata/properties" ma:root="true" ma:fieldsID="88fcfec987f7442b6217093e550796dd" ns3:_="">
     <xsd:import namespace="9d71dc66-2ce2-4fa7-946a-79ef4f85df34"/>
@@ -6831,31 +7526,22 @@
 </ct:contentTypeSchema>
 </file>
 
-<file path=customXml/itemProps1.xml><?xml version="1.0" encoding="utf-8"?>
-<ds:datastoreItem xmlns:ds="http://schemas.openxmlformats.org/officeDocument/2006/customXml" ds:itemID="{4E5BCBCC-D124-48EF-86DD-41B5B9A9E644}">
-  <ds:schemaRefs>
-    <ds:schemaRef ds:uri="http://purl.org/dc/elements/1.1/"/>
-    <ds:schemaRef ds:uri="http://schemas.microsoft.com/office/2006/metadata/properties"/>
-    <ds:schemaRef ds:uri="http://purl.org/dc/terms/"/>
-    <ds:schemaRef ds:uri="http://schemas.openxmlformats.org/package/2006/metadata/core-properties"/>
-    <ds:schemaRef ds:uri="9d71dc66-2ce2-4fa7-946a-79ef4f85df34"/>
-    <ds:schemaRef ds:uri="http://schemas.microsoft.com/office/2006/documentManagement/types"/>
-    <ds:schemaRef ds:uri="http://schemas.microsoft.com/office/infopath/2007/PartnerControls"/>
-    <ds:schemaRef ds:uri="http://www.w3.org/XML/1998/namespace"/>
-    <ds:schemaRef ds:uri="http://purl.org/dc/dcmitype/"/>
-  </ds:schemaRefs>
-</ds:datastoreItem>
+<file path=customXml/item2.xml><?xml version="1.0" encoding="utf-8"?>
+<?mso-contentType ?>
+<FormTemplates xmlns="http://schemas.microsoft.com/sharepoint/v3/contenttype/forms">
+  <Display>DocumentLibraryForm</Display>
+  <Edit>DocumentLibraryForm</Edit>
+  <New>DocumentLibraryForm</New>
+</FormTemplates>
 </file>
 
-<file path=customXml/itemProps2.xml><?xml version="1.0" encoding="utf-8"?>
-<ds:datastoreItem xmlns:ds="http://schemas.openxmlformats.org/officeDocument/2006/customXml" ds:itemID="{99DF0768-79C0-4973-A121-8A23343637D6}">
-  <ds:schemaRefs>
-    <ds:schemaRef ds:uri="http://schemas.microsoft.com/sharepoint/v3/contenttype/forms"/>
-  </ds:schemaRefs>
-</ds:datastoreItem>
+<file path=customXml/item3.xml><?xml version="1.0" encoding="utf-8"?>
+<p:properties xmlns:p="http://schemas.microsoft.com/office/2006/metadata/properties" xmlns:xsi="http://www.w3.org/2001/XMLSchema-instance" xmlns:pc="http://schemas.microsoft.com/office/infopath/2007/PartnerControls">
+  <documentManagement/>
+</p:properties>
 </file>
 
-<file path=customXml/itemProps3.xml><?xml version="1.0" encoding="utf-8"?>
+<file path=customXml/itemProps1.xml><?xml version="1.0" encoding="utf-8"?>
 <ds:datastoreItem xmlns:ds="http://schemas.openxmlformats.org/officeDocument/2006/customXml" ds:itemID="{47B0250F-D484-4D0C-8B21-1C703FD40B5E}">
   <ds:schemaRefs>
     <ds:schemaRef ds:uri="http://schemas.microsoft.com/office/2006/metadata/contentType"/>
@@ -6871,4 +7557,28 @@
     <ds:schemaRef ds:uri="http://schemas.microsoft.com/internal/obd"/>
   </ds:schemaRefs>
 </ds:datastoreItem>
+</file>
+
+<file path=customXml/itemProps2.xml><?xml version="1.0" encoding="utf-8"?>
+<ds:datastoreItem xmlns:ds="http://schemas.openxmlformats.org/officeDocument/2006/customXml" ds:itemID="{99DF0768-79C0-4973-A121-8A23343637D6}">
+  <ds:schemaRefs>
+    <ds:schemaRef ds:uri="http://schemas.microsoft.com/sharepoint/v3/contenttype/forms"/>
+  </ds:schemaRefs>
+</ds:datastoreItem>
+</file>
+
+<file path=customXml/itemProps3.xml><?xml version="1.0" encoding="utf-8"?>
+<ds:datastoreItem xmlns:ds="http://schemas.openxmlformats.org/officeDocument/2006/customXml" ds:itemID="{4E5BCBCC-D124-48EF-86DD-41B5B9A9E644}">
+  <ds:schemaRefs>
+    <ds:schemaRef ds:uri="http://purl.org/dc/terms/"/>
+    <ds:schemaRef ds:uri="http://schemas.openxmlformats.org/package/2006/metadata/core-properties"/>
+    <ds:schemaRef ds:uri="http://schemas.microsoft.com/office/2006/documentManagement/types"/>
+    <ds:schemaRef ds:uri="http://purl.org/dc/dcmitype/"/>
+    <ds:schemaRef ds:uri="http://schemas.microsoft.com/office/infopath/2007/PartnerControls"/>
+    <ds:schemaRef ds:uri="http://purl.org/dc/elements/1.1/"/>
+    <ds:schemaRef ds:uri="http://schemas.microsoft.com/office/2006/metadata/properties"/>
+    <ds:schemaRef ds:uri="9d71dc66-2ce2-4fa7-946a-79ef4f85df34"/>
+    <ds:schemaRef ds:uri="http://www.w3.org/XML/1998/namespace"/>
+  </ds:schemaRefs>
+</ds:datastoreItem>
 </file>
</xml_diff>